<commit_message>
... designing the project
</commit_message>
<xml_diff>
--- a/THE project/design/project design.pptx
+++ b/THE project/design/project design.pptx
@@ -9,7 +9,9 @@
     <p:sldId id="257" r:id="rId3"/>
     <p:sldId id="260" r:id="rId4"/>
     <p:sldId id="261" r:id="rId5"/>
-    <p:sldId id="262" r:id="rId6"/>
+    <p:sldId id="264" r:id="rId6"/>
+    <p:sldId id="262" r:id="rId7"/>
+    <p:sldId id="263" r:id="rId8"/>
   </p:sldIdLst>
   <p:sldSz cx="12192000" cy="6858000"/>
   <p:notesSz cx="6858000" cy="9144000"/>
@@ -5534,7 +5536,7 @@
         <p:spPr>
           <a:xfrm>
             <a:off x="-1" y="2259329"/>
-            <a:ext cx="4206241" cy="3770263"/>
+            <a:ext cx="4206241" cy="4351961"/>
           </a:xfrm>
           <a:prstGeom prst="rect">
             <a:avLst/>
@@ -5788,7 +5790,7 @@
             </a:r>
             <a:r>
               <a:rPr lang="zh-CN" altLang="en-US" sz="1400"/>
-              <a:t>对参考基因组的局部区域重构需要将前面获取的数据结合起来，这里要自己实现，但是具体的重构策略需要设计，不过这一部分和后面的有些关联，所以重构策略留到后面解决。</a:t>
+              <a:t>对参考基因组的局部区域重构需要将前面获取的数据结合起来，这里要自己实现，但是具体的重构策略需要设计，不过这一部分和后面的有些关联，所以重构的策略要之后解决，但是重构的步骤还是需要先考虑下的，包括重构的参考基因组要如何存储和调用，以及如何在原有的参考基因组上重构</a:t>
             </a:r>
             <a:endParaRPr lang="en-US" altLang="zh-CN" sz="1400"/>
           </a:p>
@@ -5869,7 +5871,7 @@
         <p:spPr>
           <a:xfrm>
             <a:off x="5745285" y="2681079"/>
-            <a:ext cx="4206241" cy="1124410"/>
+            <a:ext cx="4206241" cy="1446550"/>
           </a:xfrm>
           <a:prstGeom prst="rect">
             <a:avLst/>
@@ -6055,7 +6057,7 @@
             </a:r>
             <a:r>
               <a:rPr lang="zh-CN" altLang="en-US" sz="1400"/>
-              <a:t>需要实现的内容）</a:t>
+              <a:t>需要设计的内容）</a:t>
             </a:r>
             <a:endParaRPr lang="en-US" altLang="zh-CN" sz="1400"/>
           </a:p>
@@ -6088,6 +6090,18 @@
             <a:r>
               <a:rPr lang="zh-CN" altLang="en-US" sz="1400"/>
               <a:t>获取的数据的整理和组织）</a:t>
+            </a:r>
+            <a:endParaRPr lang="en-US" altLang="zh-CN" sz="1400"/>
+          </a:p>
+          <a:p>
+            <a:pPr algn="l"/>
+            <a:r>
+              <a:rPr lang="en-US" altLang="zh-CN" sz="1400"/>
+              <a:t>- </a:t>
+            </a:r>
+            <a:r>
+              <a:rPr lang="zh-CN" altLang="en-US" sz="1400"/>
+              <a:t>重构后的参考基因组的存储和索引方法</a:t>
             </a:r>
             <a:endParaRPr lang="en-US" altLang="zh-CN" sz="1400"/>
           </a:p>
@@ -6142,6 +6156,1135 @@
         <p:spPr>
           <a:xfrm>
             <a:off x="-1" y="0"/>
+            <a:ext cx="5582195" cy="383177"/>
+          </a:xfrm>
+        </p:spPr>
+        <p:txBody>
+          <a:bodyPr/>
+          <a:lstStyle/>
+          <a:p>
+            <a:r>
+              <a:rPr lang="zh-CN" altLang="en-US"/>
+              <a:t>基于变异数据的局部参考基因组重构</a:t>
+            </a:r>
+          </a:p>
+        </p:txBody>
+      </p:sp>
+      <p:sp>
+        <p:nvSpPr>
+          <p:cNvPr id="12" name="副标题 2">
+            <a:extLst>
+              <a:ext uri="{FF2B5EF4-FFF2-40B4-BE49-F238E27FC236}">
+                <a16:creationId xmlns:a16="http://schemas.microsoft.com/office/drawing/2014/main" id="{254A46BC-F2A8-4252-8B6B-EA2A98A007F3}"/>
+              </a:ext>
+            </a:extLst>
+          </p:cNvPr>
+          <p:cNvSpPr txBox="1">
+            <a:spLocks/>
+          </p:cNvSpPr>
+          <p:nvPr/>
+        </p:nvSpPr>
+        <p:spPr>
+          <a:xfrm>
+            <a:off x="8412478" y="842127"/>
+            <a:ext cx="2669177" cy="3129062"/>
+          </a:xfrm>
+          <a:prstGeom prst="rect">
+            <a:avLst/>
+          </a:prstGeom>
+        </p:spPr>
+        <p:txBody>
+          <a:bodyPr vert="horz" wrap="square" lIns="91440" tIns="45720" rIns="91440" bIns="45720" rtlCol="0">
+            <a:spAutoFit/>
+          </a:bodyPr>
+          <a:lstStyle>
+            <a:lvl1pPr marL="0" indent="0" algn="ctr" defTabSz="540000" rtl="0" eaLnBrk="1" latinLnBrk="0" hangingPunct="1">
+              <a:lnSpc>
+                <a:spcPct val="90000"/>
+              </a:lnSpc>
+              <a:spcBef>
+                <a:spcPts val="1000"/>
+              </a:spcBef>
+              <a:buFont typeface="Arial" panose="020B0604020202020204" pitchFamily="34" charset="0"/>
+              <a:buNone/>
+              <a:defRPr sz="2400" kern="1200" baseline="0">
+                <a:solidFill>
+                  <a:schemeClr val="tx1"/>
+                </a:solidFill>
+                <a:latin typeface="Consolas" panose="020B0609020204030204" pitchFamily="49" charset="0"/>
+                <a:ea typeface="微软雅黑" panose="020B0503020204020204" pitchFamily="34" charset="-122"/>
+                <a:cs typeface="+mn-cs"/>
+              </a:defRPr>
+            </a:lvl1pPr>
+            <a:lvl2pPr marL="457200" indent="0" algn="ctr" defTabSz="540000" rtl="0" eaLnBrk="1" latinLnBrk="0" hangingPunct="1">
+              <a:lnSpc>
+                <a:spcPct val="90000"/>
+              </a:lnSpc>
+              <a:spcBef>
+                <a:spcPts val="500"/>
+              </a:spcBef>
+              <a:buFont typeface="Arial" panose="020B0604020202020204" pitchFamily="34" charset="0"/>
+              <a:buNone/>
+              <a:defRPr sz="2000" kern="1200" baseline="0">
+                <a:solidFill>
+                  <a:schemeClr val="tx1"/>
+                </a:solidFill>
+                <a:latin typeface="Consolas" panose="020B0609020204030204" pitchFamily="49" charset="0"/>
+                <a:ea typeface="微软雅黑" panose="020B0503020204020204" pitchFamily="34" charset="-122"/>
+                <a:cs typeface="+mn-cs"/>
+              </a:defRPr>
+            </a:lvl2pPr>
+            <a:lvl3pPr marL="914400" indent="0" algn="ctr" defTabSz="540000" rtl="0" eaLnBrk="1" latinLnBrk="0" hangingPunct="1">
+              <a:lnSpc>
+                <a:spcPct val="90000"/>
+              </a:lnSpc>
+              <a:spcBef>
+                <a:spcPts val="500"/>
+              </a:spcBef>
+              <a:buFont typeface="Arial" panose="020B0604020202020204" pitchFamily="34" charset="0"/>
+              <a:buNone/>
+              <a:defRPr sz="1800" kern="1200" baseline="0">
+                <a:solidFill>
+                  <a:schemeClr val="tx1"/>
+                </a:solidFill>
+                <a:latin typeface="Consolas" panose="020B0609020204030204" pitchFamily="49" charset="0"/>
+                <a:ea typeface="微软雅黑" panose="020B0503020204020204" pitchFamily="34" charset="-122"/>
+                <a:cs typeface="+mn-cs"/>
+              </a:defRPr>
+            </a:lvl3pPr>
+            <a:lvl4pPr marL="1371600" indent="0" algn="ctr" defTabSz="540000" rtl="0" eaLnBrk="1" latinLnBrk="0" hangingPunct="1">
+              <a:lnSpc>
+                <a:spcPct val="90000"/>
+              </a:lnSpc>
+              <a:spcBef>
+                <a:spcPts val="500"/>
+              </a:spcBef>
+              <a:buFont typeface="Arial" panose="020B0604020202020204" pitchFamily="34" charset="0"/>
+              <a:buNone/>
+              <a:defRPr sz="1600" kern="1200" baseline="0">
+                <a:solidFill>
+                  <a:schemeClr val="tx1"/>
+                </a:solidFill>
+                <a:latin typeface="Consolas" panose="020B0609020204030204" pitchFamily="49" charset="0"/>
+                <a:ea typeface="微软雅黑" panose="020B0503020204020204" pitchFamily="34" charset="-122"/>
+                <a:cs typeface="+mn-cs"/>
+              </a:defRPr>
+            </a:lvl4pPr>
+            <a:lvl5pPr marL="1828800" indent="0" algn="ctr" defTabSz="540000" rtl="0" eaLnBrk="1" latinLnBrk="0" hangingPunct="1">
+              <a:lnSpc>
+                <a:spcPct val="90000"/>
+              </a:lnSpc>
+              <a:spcBef>
+                <a:spcPts val="500"/>
+              </a:spcBef>
+              <a:buFont typeface="Arial" panose="020B0604020202020204" pitchFamily="34" charset="0"/>
+              <a:buNone/>
+              <a:defRPr sz="1600" kern="1200" baseline="0">
+                <a:solidFill>
+                  <a:schemeClr val="tx1"/>
+                </a:solidFill>
+                <a:latin typeface="Consolas" panose="020B0609020204030204" pitchFamily="49" charset="0"/>
+                <a:ea typeface="微软雅黑" panose="020B0503020204020204" pitchFamily="34" charset="-122"/>
+                <a:cs typeface="+mn-cs"/>
+              </a:defRPr>
+            </a:lvl5pPr>
+            <a:lvl6pPr marL="2286000" indent="0" algn="ctr" defTabSz="914400" rtl="0" eaLnBrk="1" latinLnBrk="0" hangingPunct="1">
+              <a:lnSpc>
+                <a:spcPct val="90000"/>
+              </a:lnSpc>
+              <a:spcBef>
+                <a:spcPts val="500"/>
+              </a:spcBef>
+              <a:buFont typeface="Arial" panose="020B0604020202020204" pitchFamily="34" charset="0"/>
+              <a:buNone/>
+              <a:defRPr sz="1600" kern="1200">
+                <a:solidFill>
+                  <a:schemeClr val="tx1"/>
+                </a:solidFill>
+                <a:latin typeface="+mn-lt"/>
+                <a:ea typeface="+mn-ea"/>
+                <a:cs typeface="+mn-cs"/>
+              </a:defRPr>
+            </a:lvl6pPr>
+            <a:lvl7pPr marL="2743200" indent="0" algn="ctr" defTabSz="914400" rtl="0" eaLnBrk="1" latinLnBrk="0" hangingPunct="1">
+              <a:lnSpc>
+                <a:spcPct val="90000"/>
+              </a:lnSpc>
+              <a:spcBef>
+                <a:spcPts val="500"/>
+              </a:spcBef>
+              <a:buFont typeface="Arial" panose="020B0604020202020204" pitchFamily="34" charset="0"/>
+              <a:buNone/>
+              <a:defRPr sz="1600" kern="1200">
+                <a:solidFill>
+                  <a:schemeClr val="tx1"/>
+                </a:solidFill>
+                <a:latin typeface="+mn-lt"/>
+                <a:ea typeface="+mn-ea"/>
+                <a:cs typeface="+mn-cs"/>
+              </a:defRPr>
+            </a:lvl7pPr>
+            <a:lvl8pPr marL="3200400" indent="0" algn="ctr" defTabSz="914400" rtl="0" eaLnBrk="1" latinLnBrk="0" hangingPunct="1">
+              <a:lnSpc>
+                <a:spcPct val="90000"/>
+              </a:lnSpc>
+              <a:spcBef>
+                <a:spcPts val="500"/>
+              </a:spcBef>
+              <a:buFont typeface="Arial" panose="020B0604020202020204" pitchFamily="34" charset="0"/>
+              <a:buNone/>
+              <a:defRPr sz="1600" kern="1200">
+                <a:solidFill>
+                  <a:schemeClr val="tx1"/>
+                </a:solidFill>
+                <a:latin typeface="+mn-lt"/>
+                <a:ea typeface="+mn-ea"/>
+                <a:cs typeface="+mn-cs"/>
+              </a:defRPr>
+            </a:lvl8pPr>
+            <a:lvl9pPr marL="3657600" indent="0" algn="ctr" defTabSz="914400" rtl="0" eaLnBrk="1" latinLnBrk="0" hangingPunct="1">
+              <a:lnSpc>
+                <a:spcPct val="90000"/>
+              </a:lnSpc>
+              <a:spcBef>
+                <a:spcPts val="500"/>
+              </a:spcBef>
+              <a:buFont typeface="Arial" panose="020B0604020202020204" pitchFamily="34" charset="0"/>
+              <a:buNone/>
+              <a:defRPr sz="1600" kern="1200">
+                <a:solidFill>
+                  <a:schemeClr val="tx1"/>
+                </a:solidFill>
+                <a:latin typeface="+mn-lt"/>
+                <a:ea typeface="+mn-ea"/>
+                <a:cs typeface="+mn-cs"/>
+              </a:defRPr>
+            </a:lvl9pPr>
+          </a:lstStyle>
+          <a:p>
+            <a:pPr algn="l"/>
+            <a:r>
+              <a:rPr lang="en-US" altLang="zh-CN" sz="1400"/>
+              <a:t>【</a:t>
+            </a:r>
+            <a:r>
+              <a:rPr lang="zh-CN" altLang="en-US" sz="1400"/>
+              <a:t>暂定</a:t>
+            </a:r>
+            <a:r>
+              <a:rPr lang="en-US" altLang="zh-CN" sz="1400"/>
+              <a:t>】</a:t>
+            </a:r>
+            <a:r>
+              <a:rPr lang="zh-CN" altLang="en-US" sz="1400"/>
+              <a:t>本阶段先完成这个目标：查看</a:t>
+            </a:r>
+            <a:r>
+              <a:rPr lang="en-US" altLang="zh-CN" sz="1400"/>
+              <a:t>vcf</a:t>
+            </a:r>
+            <a:r>
+              <a:rPr lang="zh-CN" altLang="en-US" sz="1400"/>
+              <a:t>文件中是否有类似的前面提到的邻近可组合或是有重叠区域的变异。</a:t>
+            </a:r>
+            <a:endParaRPr lang="en-US" altLang="zh-CN" sz="1400"/>
+          </a:p>
+          <a:p>
+            <a:pPr algn="l"/>
+            <a:r>
+              <a:rPr lang="zh-CN" altLang="en-US" sz="1400"/>
+              <a:t>不过考虑到</a:t>
+            </a:r>
+            <a:r>
+              <a:rPr lang="en-US" altLang="zh-CN" sz="1400"/>
+              <a:t>SV</a:t>
+            </a:r>
+            <a:r>
+              <a:rPr lang="zh-CN" altLang="en-US" sz="1400"/>
+              <a:t>的存在，往往一个</a:t>
+            </a:r>
+            <a:r>
+              <a:rPr lang="en-US" altLang="zh-CN" sz="1400"/>
+              <a:t>SV</a:t>
+            </a:r>
+            <a:r>
+              <a:rPr lang="zh-CN" altLang="en-US" sz="1400"/>
+              <a:t>之中就有一大堆的</a:t>
+            </a:r>
+            <a:r>
+              <a:rPr lang="en-US" altLang="zh-CN" sz="1400"/>
+              <a:t>SNP</a:t>
+            </a:r>
+            <a:r>
+              <a:rPr lang="zh-CN" altLang="en-US" sz="1400"/>
+              <a:t>，这种情况下，就先按照</a:t>
+            </a:r>
+            <a:r>
+              <a:rPr lang="en-US" altLang="zh-CN" sz="1400"/>
+              <a:t>SV</a:t>
+            </a:r>
+            <a:r>
+              <a:rPr lang="zh-CN" altLang="en-US" sz="1400"/>
+              <a:t>优先的原则来吧。但是，如果效果不好的话，究竟采用什么样的策略做比较好这点也不太清楚啊。。。。总之先把这个整合的功能实现了再说，之后的整合策略就是拼积木了。。。我寻思要不要用一下机器学习的方法？</a:t>
+            </a:r>
+            <a:endParaRPr lang="en-US" altLang="zh-CN" sz="1400"/>
+          </a:p>
+        </p:txBody>
+      </p:sp>
+      <p:sp>
+        <p:nvSpPr>
+          <p:cNvPr id="10" name="副标题 2">
+            <a:extLst>
+              <a:ext uri="{FF2B5EF4-FFF2-40B4-BE49-F238E27FC236}">
+                <a16:creationId xmlns:a16="http://schemas.microsoft.com/office/drawing/2014/main" id="{BBB7F5FD-FAB2-47AF-B5D2-FB22ECB3FCE0}"/>
+              </a:ext>
+            </a:extLst>
+          </p:cNvPr>
+          <p:cNvSpPr txBox="1">
+            <a:spLocks/>
+          </p:cNvSpPr>
+          <p:nvPr/>
+        </p:nvSpPr>
+        <p:spPr>
+          <a:xfrm>
+            <a:off x="0" y="505098"/>
+            <a:ext cx="4206241" cy="930511"/>
+          </a:xfrm>
+          <a:prstGeom prst="rect">
+            <a:avLst/>
+          </a:prstGeom>
+        </p:spPr>
+        <p:txBody>
+          <a:bodyPr vert="horz" wrap="square" lIns="91440" tIns="45720" rIns="91440" bIns="45720" rtlCol="0">
+            <a:spAutoFit/>
+          </a:bodyPr>
+          <a:lstStyle>
+            <a:lvl1pPr marL="0" indent="0" algn="ctr" defTabSz="540000" rtl="0" eaLnBrk="1" latinLnBrk="0" hangingPunct="1">
+              <a:lnSpc>
+                <a:spcPct val="90000"/>
+              </a:lnSpc>
+              <a:spcBef>
+                <a:spcPts val="1000"/>
+              </a:spcBef>
+              <a:buFont typeface="Arial" panose="020B0604020202020204" pitchFamily="34" charset="0"/>
+              <a:buNone/>
+              <a:defRPr sz="2400" kern="1200" baseline="0">
+                <a:solidFill>
+                  <a:schemeClr val="tx1"/>
+                </a:solidFill>
+                <a:latin typeface="Consolas" panose="020B0609020204030204" pitchFamily="49" charset="0"/>
+                <a:ea typeface="微软雅黑" panose="020B0503020204020204" pitchFamily="34" charset="-122"/>
+                <a:cs typeface="+mn-cs"/>
+              </a:defRPr>
+            </a:lvl1pPr>
+            <a:lvl2pPr marL="457200" indent="0" algn="ctr" defTabSz="540000" rtl="0" eaLnBrk="1" latinLnBrk="0" hangingPunct="1">
+              <a:lnSpc>
+                <a:spcPct val="90000"/>
+              </a:lnSpc>
+              <a:spcBef>
+                <a:spcPts val="500"/>
+              </a:spcBef>
+              <a:buFont typeface="Arial" panose="020B0604020202020204" pitchFamily="34" charset="0"/>
+              <a:buNone/>
+              <a:defRPr sz="2000" kern="1200" baseline="0">
+                <a:solidFill>
+                  <a:schemeClr val="tx1"/>
+                </a:solidFill>
+                <a:latin typeface="Consolas" panose="020B0609020204030204" pitchFamily="49" charset="0"/>
+                <a:ea typeface="微软雅黑" panose="020B0503020204020204" pitchFamily="34" charset="-122"/>
+                <a:cs typeface="+mn-cs"/>
+              </a:defRPr>
+            </a:lvl2pPr>
+            <a:lvl3pPr marL="914400" indent="0" algn="ctr" defTabSz="540000" rtl="0" eaLnBrk="1" latinLnBrk="0" hangingPunct="1">
+              <a:lnSpc>
+                <a:spcPct val="90000"/>
+              </a:lnSpc>
+              <a:spcBef>
+                <a:spcPts val="500"/>
+              </a:spcBef>
+              <a:buFont typeface="Arial" panose="020B0604020202020204" pitchFamily="34" charset="0"/>
+              <a:buNone/>
+              <a:defRPr sz="1800" kern="1200" baseline="0">
+                <a:solidFill>
+                  <a:schemeClr val="tx1"/>
+                </a:solidFill>
+                <a:latin typeface="Consolas" panose="020B0609020204030204" pitchFamily="49" charset="0"/>
+                <a:ea typeface="微软雅黑" panose="020B0503020204020204" pitchFamily="34" charset="-122"/>
+                <a:cs typeface="+mn-cs"/>
+              </a:defRPr>
+            </a:lvl3pPr>
+            <a:lvl4pPr marL="1371600" indent="0" algn="ctr" defTabSz="540000" rtl="0" eaLnBrk="1" latinLnBrk="0" hangingPunct="1">
+              <a:lnSpc>
+                <a:spcPct val="90000"/>
+              </a:lnSpc>
+              <a:spcBef>
+                <a:spcPts val="500"/>
+              </a:spcBef>
+              <a:buFont typeface="Arial" panose="020B0604020202020204" pitchFamily="34" charset="0"/>
+              <a:buNone/>
+              <a:defRPr sz="1600" kern="1200" baseline="0">
+                <a:solidFill>
+                  <a:schemeClr val="tx1"/>
+                </a:solidFill>
+                <a:latin typeface="Consolas" panose="020B0609020204030204" pitchFamily="49" charset="0"/>
+                <a:ea typeface="微软雅黑" panose="020B0503020204020204" pitchFamily="34" charset="-122"/>
+                <a:cs typeface="+mn-cs"/>
+              </a:defRPr>
+            </a:lvl4pPr>
+            <a:lvl5pPr marL="1828800" indent="0" algn="ctr" defTabSz="540000" rtl="0" eaLnBrk="1" latinLnBrk="0" hangingPunct="1">
+              <a:lnSpc>
+                <a:spcPct val="90000"/>
+              </a:lnSpc>
+              <a:spcBef>
+                <a:spcPts val="500"/>
+              </a:spcBef>
+              <a:buFont typeface="Arial" panose="020B0604020202020204" pitchFamily="34" charset="0"/>
+              <a:buNone/>
+              <a:defRPr sz="1600" kern="1200" baseline="0">
+                <a:solidFill>
+                  <a:schemeClr val="tx1"/>
+                </a:solidFill>
+                <a:latin typeface="Consolas" panose="020B0609020204030204" pitchFamily="49" charset="0"/>
+                <a:ea typeface="微软雅黑" panose="020B0503020204020204" pitchFamily="34" charset="-122"/>
+                <a:cs typeface="+mn-cs"/>
+              </a:defRPr>
+            </a:lvl5pPr>
+            <a:lvl6pPr marL="2286000" indent="0" algn="ctr" defTabSz="914400" rtl="0" eaLnBrk="1" latinLnBrk="0" hangingPunct="1">
+              <a:lnSpc>
+                <a:spcPct val="90000"/>
+              </a:lnSpc>
+              <a:spcBef>
+                <a:spcPts val="500"/>
+              </a:spcBef>
+              <a:buFont typeface="Arial" panose="020B0604020202020204" pitchFamily="34" charset="0"/>
+              <a:buNone/>
+              <a:defRPr sz="1600" kern="1200">
+                <a:solidFill>
+                  <a:schemeClr val="tx1"/>
+                </a:solidFill>
+                <a:latin typeface="+mn-lt"/>
+                <a:ea typeface="+mn-ea"/>
+                <a:cs typeface="+mn-cs"/>
+              </a:defRPr>
+            </a:lvl6pPr>
+            <a:lvl7pPr marL="2743200" indent="0" algn="ctr" defTabSz="914400" rtl="0" eaLnBrk="1" latinLnBrk="0" hangingPunct="1">
+              <a:lnSpc>
+                <a:spcPct val="90000"/>
+              </a:lnSpc>
+              <a:spcBef>
+                <a:spcPts val="500"/>
+              </a:spcBef>
+              <a:buFont typeface="Arial" panose="020B0604020202020204" pitchFamily="34" charset="0"/>
+              <a:buNone/>
+              <a:defRPr sz="1600" kern="1200">
+                <a:solidFill>
+                  <a:schemeClr val="tx1"/>
+                </a:solidFill>
+                <a:latin typeface="+mn-lt"/>
+                <a:ea typeface="+mn-ea"/>
+                <a:cs typeface="+mn-cs"/>
+              </a:defRPr>
+            </a:lvl7pPr>
+            <a:lvl8pPr marL="3200400" indent="0" algn="ctr" defTabSz="914400" rtl="0" eaLnBrk="1" latinLnBrk="0" hangingPunct="1">
+              <a:lnSpc>
+                <a:spcPct val="90000"/>
+              </a:lnSpc>
+              <a:spcBef>
+                <a:spcPts val="500"/>
+              </a:spcBef>
+              <a:buFont typeface="Arial" panose="020B0604020202020204" pitchFamily="34" charset="0"/>
+              <a:buNone/>
+              <a:defRPr sz="1600" kern="1200">
+                <a:solidFill>
+                  <a:schemeClr val="tx1"/>
+                </a:solidFill>
+                <a:latin typeface="+mn-lt"/>
+                <a:ea typeface="+mn-ea"/>
+                <a:cs typeface="+mn-cs"/>
+              </a:defRPr>
+            </a:lvl8pPr>
+            <a:lvl9pPr marL="3657600" indent="0" algn="ctr" defTabSz="914400" rtl="0" eaLnBrk="1" latinLnBrk="0" hangingPunct="1">
+              <a:lnSpc>
+                <a:spcPct val="90000"/>
+              </a:lnSpc>
+              <a:spcBef>
+                <a:spcPts val="500"/>
+              </a:spcBef>
+              <a:buFont typeface="Arial" panose="020B0604020202020204" pitchFamily="34" charset="0"/>
+              <a:buNone/>
+              <a:defRPr sz="1600" kern="1200">
+                <a:solidFill>
+                  <a:schemeClr val="tx1"/>
+                </a:solidFill>
+                <a:latin typeface="+mn-lt"/>
+                <a:ea typeface="+mn-ea"/>
+                <a:cs typeface="+mn-cs"/>
+              </a:defRPr>
+            </a:lvl9pPr>
+          </a:lstStyle>
+          <a:p>
+            <a:pPr algn="l"/>
+            <a:r>
+              <a:rPr lang="zh-CN" altLang="en-US" sz="1400"/>
+              <a:t>实现目标：</a:t>
+            </a:r>
+            <a:endParaRPr lang="en-US" altLang="zh-CN" sz="1400"/>
+          </a:p>
+          <a:p>
+            <a:pPr algn="l"/>
+            <a:r>
+              <a:rPr lang="en-US" altLang="zh-CN" sz="1400"/>
+              <a:t>- SNP</a:t>
+            </a:r>
+            <a:r>
+              <a:rPr lang="zh-CN" altLang="en-US" sz="1400"/>
+              <a:t>的插入、删除、替换</a:t>
+            </a:r>
+            <a:endParaRPr lang="en-US" altLang="zh-CN" sz="1400"/>
+          </a:p>
+          <a:p>
+            <a:pPr algn="l"/>
+            <a:r>
+              <a:rPr lang="en-US" altLang="zh-CN" sz="1400"/>
+              <a:t>- SV</a:t>
+            </a:r>
+            <a:r>
+              <a:rPr lang="zh-CN" altLang="en-US" sz="1400"/>
+              <a:t>的重复、缺失、倒位</a:t>
+            </a:r>
+            <a:endParaRPr lang="en-US" altLang="zh-CN" sz="1400"/>
+          </a:p>
+        </p:txBody>
+      </p:sp>
+      <p:sp>
+        <p:nvSpPr>
+          <p:cNvPr id="16" name="副标题 2">
+            <a:extLst>
+              <a:ext uri="{FF2B5EF4-FFF2-40B4-BE49-F238E27FC236}">
+                <a16:creationId xmlns:a16="http://schemas.microsoft.com/office/drawing/2014/main" id="{F71DAEDA-581F-4561-B0EA-1ACF0213F27C}"/>
+              </a:ext>
+            </a:extLst>
+          </p:cNvPr>
+          <p:cNvSpPr txBox="1">
+            <a:spLocks/>
+          </p:cNvSpPr>
+          <p:nvPr/>
+        </p:nvSpPr>
+        <p:spPr>
+          <a:xfrm>
+            <a:off x="-1" y="2201809"/>
+            <a:ext cx="4206241" cy="608372"/>
+          </a:xfrm>
+          <a:prstGeom prst="rect">
+            <a:avLst/>
+          </a:prstGeom>
+        </p:spPr>
+        <p:txBody>
+          <a:bodyPr vert="horz" wrap="square" lIns="91440" tIns="45720" rIns="91440" bIns="45720" rtlCol="0">
+            <a:spAutoFit/>
+          </a:bodyPr>
+          <a:lstStyle>
+            <a:lvl1pPr marL="0" indent="0" algn="ctr" defTabSz="540000" rtl="0" eaLnBrk="1" latinLnBrk="0" hangingPunct="1">
+              <a:lnSpc>
+                <a:spcPct val="90000"/>
+              </a:lnSpc>
+              <a:spcBef>
+                <a:spcPts val="1000"/>
+              </a:spcBef>
+              <a:buFont typeface="Arial" panose="020B0604020202020204" pitchFamily="34" charset="0"/>
+              <a:buNone/>
+              <a:defRPr sz="2400" kern="1200" baseline="0">
+                <a:solidFill>
+                  <a:schemeClr val="tx1"/>
+                </a:solidFill>
+                <a:latin typeface="Consolas" panose="020B0609020204030204" pitchFamily="49" charset="0"/>
+                <a:ea typeface="微软雅黑" panose="020B0503020204020204" pitchFamily="34" charset="-122"/>
+                <a:cs typeface="+mn-cs"/>
+              </a:defRPr>
+            </a:lvl1pPr>
+            <a:lvl2pPr marL="457200" indent="0" algn="ctr" defTabSz="540000" rtl="0" eaLnBrk="1" latinLnBrk="0" hangingPunct="1">
+              <a:lnSpc>
+                <a:spcPct val="90000"/>
+              </a:lnSpc>
+              <a:spcBef>
+                <a:spcPts val="500"/>
+              </a:spcBef>
+              <a:buFont typeface="Arial" panose="020B0604020202020204" pitchFamily="34" charset="0"/>
+              <a:buNone/>
+              <a:defRPr sz="2000" kern="1200" baseline="0">
+                <a:solidFill>
+                  <a:schemeClr val="tx1"/>
+                </a:solidFill>
+                <a:latin typeface="Consolas" panose="020B0609020204030204" pitchFamily="49" charset="0"/>
+                <a:ea typeface="微软雅黑" panose="020B0503020204020204" pitchFamily="34" charset="-122"/>
+                <a:cs typeface="+mn-cs"/>
+              </a:defRPr>
+            </a:lvl2pPr>
+            <a:lvl3pPr marL="914400" indent="0" algn="ctr" defTabSz="540000" rtl="0" eaLnBrk="1" latinLnBrk="0" hangingPunct="1">
+              <a:lnSpc>
+                <a:spcPct val="90000"/>
+              </a:lnSpc>
+              <a:spcBef>
+                <a:spcPts val="500"/>
+              </a:spcBef>
+              <a:buFont typeface="Arial" panose="020B0604020202020204" pitchFamily="34" charset="0"/>
+              <a:buNone/>
+              <a:defRPr sz="1800" kern="1200" baseline="0">
+                <a:solidFill>
+                  <a:schemeClr val="tx1"/>
+                </a:solidFill>
+                <a:latin typeface="Consolas" panose="020B0609020204030204" pitchFamily="49" charset="0"/>
+                <a:ea typeface="微软雅黑" panose="020B0503020204020204" pitchFamily="34" charset="-122"/>
+                <a:cs typeface="+mn-cs"/>
+              </a:defRPr>
+            </a:lvl3pPr>
+            <a:lvl4pPr marL="1371600" indent="0" algn="ctr" defTabSz="540000" rtl="0" eaLnBrk="1" latinLnBrk="0" hangingPunct="1">
+              <a:lnSpc>
+                <a:spcPct val="90000"/>
+              </a:lnSpc>
+              <a:spcBef>
+                <a:spcPts val="500"/>
+              </a:spcBef>
+              <a:buFont typeface="Arial" panose="020B0604020202020204" pitchFamily="34" charset="0"/>
+              <a:buNone/>
+              <a:defRPr sz="1600" kern="1200" baseline="0">
+                <a:solidFill>
+                  <a:schemeClr val="tx1"/>
+                </a:solidFill>
+                <a:latin typeface="Consolas" panose="020B0609020204030204" pitchFamily="49" charset="0"/>
+                <a:ea typeface="微软雅黑" panose="020B0503020204020204" pitchFamily="34" charset="-122"/>
+                <a:cs typeface="+mn-cs"/>
+              </a:defRPr>
+            </a:lvl4pPr>
+            <a:lvl5pPr marL="1828800" indent="0" algn="ctr" defTabSz="540000" rtl="0" eaLnBrk="1" latinLnBrk="0" hangingPunct="1">
+              <a:lnSpc>
+                <a:spcPct val="90000"/>
+              </a:lnSpc>
+              <a:spcBef>
+                <a:spcPts val="500"/>
+              </a:spcBef>
+              <a:buFont typeface="Arial" panose="020B0604020202020204" pitchFamily="34" charset="0"/>
+              <a:buNone/>
+              <a:defRPr sz="1600" kern="1200" baseline="0">
+                <a:solidFill>
+                  <a:schemeClr val="tx1"/>
+                </a:solidFill>
+                <a:latin typeface="Consolas" panose="020B0609020204030204" pitchFamily="49" charset="0"/>
+                <a:ea typeface="微软雅黑" panose="020B0503020204020204" pitchFamily="34" charset="-122"/>
+                <a:cs typeface="+mn-cs"/>
+              </a:defRPr>
+            </a:lvl5pPr>
+            <a:lvl6pPr marL="2286000" indent="0" algn="ctr" defTabSz="914400" rtl="0" eaLnBrk="1" latinLnBrk="0" hangingPunct="1">
+              <a:lnSpc>
+                <a:spcPct val="90000"/>
+              </a:lnSpc>
+              <a:spcBef>
+                <a:spcPts val="500"/>
+              </a:spcBef>
+              <a:buFont typeface="Arial" panose="020B0604020202020204" pitchFamily="34" charset="0"/>
+              <a:buNone/>
+              <a:defRPr sz="1600" kern="1200">
+                <a:solidFill>
+                  <a:schemeClr val="tx1"/>
+                </a:solidFill>
+                <a:latin typeface="+mn-lt"/>
+                <a:ea typeface="+mn-ea"/>
+                <a:cs typeface="+mn-cs"/>
+              </a:defRPr>
+            </a:lvl6pPr>
+            <a:lvl7pPr marL="2743200" indent="0" algn="ctr" defTabSz="914400" rtl="0" eaLnBrk="1" latinLnBrk="0" hangingPunct="1">
+              <a:lnSpc>
+                <a:spcPct val="90000"/>
+              </a:lnSpc>
+              <a:spcBef>
+                <a:spcPts val="500"/>
+              </a:spcBef>
+              <a:buFont typeface="Arial" panose="020B0604020202020204" pitchFamily="34" charset="0"/>
+              <a:buNone/>
+              <a:defRPr sz="1600" kern="1200">
+                <a:solidFill>
+                  <a:schemeClr val="tx1"/>
+                </a:solidFill>
+                <a:latin typeface="+mn-lt"/>
+                <a:ea typeface="+mn-ea"/>
+                <a:cs typeface="+mn-cs"/>
+              </a:defRPr>
+            </a:lvl7pPr>
+            <a:lvl8pPr marL="3200400" indent="0" algn="ctr" defTabSz="914400" rtl="0" eaLnBrk="1" latinLnBrk="0" hangingPunct="1">
+              <a:lnSpc>
+                <a:spcPct val="90000"/>
+              </a:lnSpc>
+              <a:spcBef>
+                <a:spcPts val="500"/>
+              </a:spcBef>
+              <a:buFont typeface="Arial" panose="020B0604020202020204" pitchFamily="34" charset="0"/>
+              <a:buNone/>
+              <a:defRPr sz="1600" kern="1200">
+                <a:solidFill>
+                  <a:schemeClr val="tx1"/>
+                </a:solidFill>
+                <a:latin typeface="+mn-lt"/>
+                <a:ea typeface="+mn-ea"/>
+                <a:cs typeface="+mn-cs"/>
+              </a:defRPr>
+            </a:lvl8pPr>
+            <a:lvl9pPr marL="3657600" indent="0" algn="ctr" defTabSz="914400" rtl="0" eaLnBrk="1" latinLnBrk="0" hangingPunct="1">
+              <a:lnSpc>
+                <a:spcPct val="90000"/>
+              </a:lnSpc>
+              <a:spcBef>
+                <a:spcPts val="500"/>
+              </a:spcBef>
+              <a:buFont typeface="Arial" panose="020B0604020202020204" pitchFamily="34" charset="0"/>
+              <a:buNone/>
+              <a:defRPr sz="1600" kern="1200">
+                <a:solidFill>
+                  <a:schemeClr val="tx1"/>
+                </a:solidFill>
+                <a:latin typeface="+mn-lt"/>
+                <a:ea typeface="+mn-ea"/>
+                <a:cs typeface="+mn-cs"/>
+              </a:defRPr>
+            </a:lvl9pPr>
+          </a:lstStyle>
+          <a:p>
+            <a:pPr algn="l"/>
+            <a:r>
+              <a:rPr lang="zh-CN" altLang="en-US" sz="1400"/>
+              <a:t>重构的具体实现设计（初步）</a:t>
+            </a:r>
+            <a:endParaRPr lang="en-US" altLang="zh-CN" sz="1400"/>
+          </a:p>
+          <a:p>
+            <a:pPr algn="l"/>
+            <a:r>
+              <a:rPr lang="en-US" altLang="zh-CN" sz="1400"/>
+              <a:t>	</a:t>
+            </a:r>
+            <a:r>
+              <a:rPr lang="zh-CN" altLang="en-US" sz="1400"/>
+              <a:t>先看下面的图，简单的变异数据的示意图</a:t>
+            </a:r>
+            <a:endParaRPr lang="en-US" altLang="zh-CN" sz="1400"/>
+          </a:p>
+        </p:txBody>
+      </p:sp>
+      <p:pic>
+        <p:nvPicPr>
+          <p:cNvPr id="7" name="图片 6">
+            <a:extLst>
+              <a:ext uri="{FF2B5EF4-FFF2-40B4-BE49-F238E27FC236}">
+                <a16:creationId xmlns:a16="http://schemas.microsoft.com/office/drawing/2014/main" id="{3AADF1AB-50B7-42AC-A98D-D13C2BB58C16}"/>
+              </a:ext>
+            </a:extLst>
+          </p:cNvPr>
+          <p:cNvPicPr>
+            <a:picLocks noChangeAspect="1"/>
+          </p:cNvPicPr>
+          <p:nvPr/>
+        </p:nvPicPr>
+        <p:blipFill>
+          <a:blip r:embed="rId2"/>
+          <a:stretch>
+            <a:fillRect/>
+          </a:stretch>
+        </p:blipFill>
+        <p:spPr>
+          <a:xfrm>
+            <a:off x="-1" y="2898117"/>
+            <a:ext cx="4427622" cy="3959883"/>
+          </a:xfrm>
+          <a:prstGeom prst="rect">
+            <a:avLst/>
+          </a:prstGeom>
+        </p:spPr>
+      </p:pic>
+      <p:sp>
+        <p:nvSpPr>
+          <p:cNvPr id="17" name="副标题 2">
+            <a:extLst>
+              <a:ext uri="{FF2B5EF4-FFF2-40B4-BE49-F238E27FC236}">
+                <a16:creationId xmlns:a16="http://schemas.microsoft.com/office/drawing/2014/main" id="{8ED09A38-C68A-4480-8727-F4ABBA88AD82}"/>
+              </a:ext>
+            </a:extLst>
+          </p:cNvPr>
+          <p:cNvSpPr txBox="1">
+            <a:spLocks/>
+          </p:cNvSpPr>
+          <p:nvPr/>
+        </p:nvSpPr>
+        <p:spPr>
+          <a:xfrm>
+            <a:off x="4427621" y="842127"/>
+            <a:ext cx="3484345" cy="4220643"/>
+          </a:xfrm>
+          <a:prstGeom prst="rect">
+            <a:avLst/>
+          </a:prstGeom>
+        </p:spPr>
+        <p:txBody>
+          <a:bodyPr vert="horz" wrap="square" lIns="91440" tIns="45720" rIns="91440" bIns="45720" rtlCol="0">
+            <a:spAutoFit/>
+          </a:bodyPr>
+          <a:lstStyle>
+            <a:lvl1pPr marL="0" indent="0" algn="ctr" defTabSz="540000" rtl="0" eaLnBrk="1" latinLnBrk="0" hangingPunct="1">
+              <a:lnSpc>
+                <a:spcPct val="90000"/>
+              </a:lnSpc>
+              <a:spcBef>
+                <a:spcPts val="1000"/>
+              </a:spcBef>
+              <a:buFont typeface="Arial" panose="020B0604020202020204" pitchFamily="34" charset="0"/>
+              <a:buNone/>
+              <a:defRPr sz="2400" kern="1200" baseline="0">
+                <a:solidFill>
+                  <a:schemeClr val="tx1"/>
+                </a:solidFill>
+                <a:latin typeface="Consolas" panose="020B0609020204030204" pitchFamily="49" charset="0"/>
+                <a:ea typeface="微软雅黑" panose="020B0503020204020204" pitchFamily="34" charset="-122"/>
+                <a:cs typeface="+mn-cs"/>
+              </a:defRPr>
+            </a:lvl1pPr>
+            <a:lvl2pPr marL="457200" indent="0" algn="ctr" defTabSz="540000" rtl="0" eaLnBrk="1" latinLnBrk="0" hangingPunct="1">
+              <a:lnSpc>
+                <a:spcPct val="90000"/>
+              </a:lnSpc>
+              <a:spcBef>
+                <a:spcPts val="500"/>
+              </a:spcBef>
+              <a:buFont typeface="Arial" panose="020B0604020202020204" pitchFamily="34" charset="0"/>
+              <a:buNone/>
+              <a:defRPr sz="2000" kern="1200" baseline="0">
+                <a:solidFill>
+                  <a:schemeClr val="tx1"/>
+                </a:solidFill>
+                <a:latin typeface="Consolas" panose="020B0609020204030204" pitchFamily="49" charset="0"/>
+                <a:ea typeface="微软雅黑" panose="020B0503020204020204" pitchFamily="34" charset="-122"/>
+                <a:cs typeface="+mn-cs"/>
+              </a:defRPr>
+            </a:lvl2pPr>
+            <a:lvl3pPr marL="914400" indent="0" algn="ctr" defTabSz="540000" rtl="0" eaLnBrk="1" latinLnBrk="0" hangingPunct="1">
+              <a:lnSpc>
+                <a:spcPct val="90000"/>
+              </a:lnSpc>
+              <a:spcBef>
+                <a:spcPts val="500"/>
+              </a:spcBef>
+              <a:buFont typeface="Arial" panose="020B0604020202020204" pitchFamily="34" charset="0"/>
+              <a:buNone/>
+              <a:defRPr sz="1800" kern="1200" baseline="0">
+                <a:solidFill>
+                  <a:schemeClr val="tx1"/>
+                </a:solidFill>
+                <a:latin typeface="Consolas" panose="020B0609020204030204" pitchFamily="49" charset="0"/>
+                <a:ea typeface="微软雅黑" panose="020B0503020204020204" pitchFamily="34" charset="-122"/>
+                <a:cs typeface="+mn-cs"/>
+              </a:defRPr>
+            </a:lvl3pPr>
+            <a:lvl4pPr marL="1371600" indent="0" algn="ctr" defTabSz="540000" rtl="0" eaLnBrk="1" latinLnBrk="0" hangingPunct="1">
+              <a:lnSpc>
+                <a:spcPct val="90000"/>
+              </a:lnSpc>
+              <a:spcBef>
+                <a:spcPts val="500"/>
+              </a:spcBef>
+              <a:buFont typeface="Arial" panose="020B0604020202020204" pitchFamily="34" charset="0"/>
+              <a:buNone/>
+              <a:defRPr sz="1600" kern="1200" baseline="0">
+                <a:solidFill>
+                  <a:schemeClr val="tx1"/>
+                </a:solidFill>
+                <a:latin typeface="Consolas" panose="020B0609020204030204" pitchFamily="49" charset="0"/>
+                <a:ea typeface="微软雅黑" panose="020B0503020204020204" pitchFamily="34" charset="-122"/>
+                <a:cs typeface="+mn-cs"/>
+              </a:defRPr>
+            </a:lvl4pPr>
+            <a:lvl5pPr marL="1828800" indent="0" algn="ctr" defTabSz="540000" rtl="0" eaLnBrk="1" latinLnBrk="0" hangingPunct="1">
+              <a:lnSpc>
+                <a:spcPct val="90000"/>
+              </a:lnSpc>
+              <a:spcBef>
+                <a:spcPts val="500"/>
+              </a:spcBef>
+              <a:buFont typeface="Arial" panose="020B0604020202020204" pitchFamily="34" charset="0"/>
+              <a:buNone/>
+              <a:defRPr sz="1600" kern="1200" baseline="0">
+                <a:solidFill>
+                  <a:schemeClr val="tx1"/>
+                </a:solidFill>
+                <a:latin typeface="Consolas" panose="020B0609020204030204" pitchFamily="49" charset="0"/>
+                <a:ea typeface="微软雅黑" panose="020B0503020204020204" pitchFamily="34" charset="-122"/>
+                <a:cs typeface="+mn-cs"/>
+              </a:defRPr>
+            </a:lvl5pPr>
+            <a:lvl6pPr marL="2286000" indent="0" algn="ctr" defTabSz="914400" rtl="0" eaLnBrk="1" latinLnBrk="0" hangingPunct="1">
+              <a:lnSpc>
+                <a:spcPct val="90000"/>
+              </a:lnSpc>
+              <a:spcBef>
+                <a:spcPts val="500"/>
+              </a:spcBef>
+              <a:buFont typeface="Arial" panose="020B0604020202020204" pitchFamily="34" charset="0"/>
+              <a:buNone/>
+              <a:defRPr sz="1600" kern="1200">
+                <a:solidFill>
+                  <a:schemeClr val="tx1"/>
+                </a:solidFill>
+                <a:latin typeface="+mn-lt"/>
+                <a:ea typeface="+mn-ea"/>
+                <a:cs typeface="+mn-cs"/>
+              </a:defRPr>
+            </a:lvl6pPr>
+            <a:lvl7pPr marL="2743200" indent="0" algn="ctr" defTabSz="914400" rtl="0" eaLnBrk="1" latinLnBrk="0" hangingPunct="1">
+              <a:lnSpc>
+                <a:spcPct val="90000"/>
+              </a:lnSpc>
+              <a:spcBef>
+                <a:spcPts val="500"/>
+              </a:spcBef>
+              <a:buFont typeface="Arial" panose="020B0604020202020204" pitchFamily="34" charset="0"/>
+              <a:buNone/>
+              <a:defRPr sz="1600" kern="1200">
+                <a:solidFill>
+                  <a:schemeClr val="tx1"/>
+                </a:solidFill>
+                <a:latin typeface="+mn-lt"/>
+                <a:ea typeface="+mn-ea"/>
+                <a:cs typeface="+mn-cs"/>
+              </a:defRPr>
+            </a:lvl7pPr>
+            <a:lvl8pPr marL="3200400" indent="0" algn="ctr" defTabSz="914400" rtl="0" eaLnBrk="1" latinLnBrk="0" hangingPunct="1">
+              <a:lnSpc>
+                <a:spcPct val="90000"/>
+              </a:lnSpc>
+              <a:spcBef>
+                <a:spcPts val="500"/>
+              </a:spcBef>
+              <a:buFont typeface="Arial" panose="020B0604020202020204" pitchFamily="34" charset="0"/>
+              <a:buNone/>
+              <a:defRPr sz="1600" kern="1200">
+                <a:solidFill>
+                  <a:schemeClr val="tx1"/>
+                </a:solidFill>
+                <a:latin typeface="+mn-lt"/>
+                <a:ea typeface="+mn-ea"/>
+                <a:cs typeface="+mn-cs"/>
+              </a:defRPr>
+            </a:lvl8pPr>
+            <a:lvl9pPr marL="3657600" indent="0" algn="ctr" defTabSz="914400" rtl="0" eaLnBrk="1" latinLnBrk="0" hangingPunct="1">
+              <a:lnSpc>
+                <a:spcPct val="90000"/>
+              </a:lnSpc>
+              <a:spcBef>
+                <a:spcPts val="500"/>
+              </a:spcBef>
+              <a:buFont typeface="Arial" panose="020B0604020202020204" pitchFamily="34" charset="0"/>
+              <a:buNone/>
+              <a:defRPr sz="1600" kern="1200">
+                <a:solidFill>
+                  <a:schemeClr val="tx1"/>
+                </a:solidFill>
+                <a:latin typeface="+mn-lt"/>
+                <a:ea typeface="+mn-ea"/>
+                <a:cs typeface="+mn-cs"/>
+              </a:defRPr>
+            </a:lvl9pPr>
+          </a:lstStyle>
+          <a:p>
+            <a:pPr algn="l"/>
+            <a:r>
+              <a:rPr lang="zh-CN" altLang="en-US" sz="1400"/>
+              <a:t>需要考虑的关于变异的一些问题：</a:t>
+            </a:r>
+            <a:endParaRPr lang="en-US" altLang="zh-CN" sz="1400"/>
+          </a:p>
+          <a:p>
+            <a:pPr algn="l"/>
+            <a:r>
+              <a:rPr lang="zh-CN" altLang="en-US" sz="1400"/>
+              <a:t>（简单的问题整理和思考）</a:t>
+            </a:r>
+            <a:endParaRPr lang="en-US" altLang="zh-CN" sz="1400"/>
+          </a:p>
+          <a:p>
+            <a:pPr algn="l"/>
+            <a:r>
+              <a:rPr lang="en-US" altLang="zh-CN" sz="1400"/>
+              <a:t>	1. </a:t>
+            </a:r>
+            <a:r>
+              <a:rPr lang="zh-CN" altLang="en-US" sz="1400"/>
+              <a:t>不知道</a:t>
+            </a:r>
+            <a:r>
+              <a:rPr lang="en-US" altLang="zh-CN" sz="1400"/>
+              <a:t>vcf</a:t>
+            </a:r>
+            <a:r>
+              <a:rPr lang="zh-CN" altLang="en-US" sz="1400"/>
+              <a:t>文件里存储</a:t>
+            </a:r>
+            <a:r>
+              <a:rPr lang="en-US" altLang="zh-CN" sz="1400"/>
+              <a:t>SNP</a:t>
+            </a:r>
+            <a:r>
+              <a:rPr lang="zh-CN" altLang="en-US" sz="1400"/>
+              <a:t>的记录中是否有重叠区域的。比如</a:t>
+            </a:r>
+            <a:r>
+              <a:rPr lang="en-US" altLang="zh-CN" sz="1400"/>
+              <a:t>256</a:t>
+            </a:r>
+            <a:r>
+              <a:rPr lang="zh-CN" altLang="en-US" sz="1400"/>
+              <a:t>和</a:t>
+            </a:r>
+            <a:r>
+              <a:rPr lang="en-US" altLang="zh-CN" sz="1400"/>
+              <a:t>259</a:t>
+            </a:r>
+            <a:r>
+              <a:rPr lang="zh-CN" altLang="en-US" sz="1400"/>
+              <a:t>的位置，理论上也可以表示为</a:t>
+            </a:r>
+            <a:endParaRPr lang="en-US" altLang="zh-CN" sz="1400"/>
+          </a:p>
+          <a:p>
+            <a:pPr algn="l"/>
+            <a:r>
+              <a:rPr lang="en-US" altLang="zh-CN" sz="1400"/>
+              <a:t>	256	TTG	T</a:t>
+            </a:r>
+            <a:r>
+              <a:rPr lang="zh-CN" altLang="en-US" sz="1400"/>
+              <a:t>，</a:t>
+            </a:r>
+            <a:r>
+              <a:rPr lang="en-US" altLang="zh-CN" sz="1400"/>
+              <a:t>CCCC</a:t>
+            </a:r>
+          </a:p>
+          <a:p>
+            <a:pPr algn="l"/>
+            <a:r>
+              <a:rPr lang="en-US" altLang="zh-CN" sz="1400"/>
+              <a:t>	259	G	TT</a:t>
+            </a:r>
+          </a:p>
+          <a:p>
+            <a:pPr algn="l"/>
+            <a:r>
+              <a:rPr lang="en-US" altLang="zh-CN" sz="1400"/>
+              <a:t>	</a:t>
+            </a:r>
+            <a:r>
+              <a:rPr lang="zh-CN" altLang="en-US" sz="1400"/>
+              <a:t>这并不会产生歧义，但是这是两种不同的表示方式。。。算了，这里先假设不会有这种，先假设都是按照这个来</a:t>
+            </a:r>
+            <a:endParaRPr lang="en-US" altLang="zh-CN" sz="1400"/>
+          </a:p>
+          <a:p>
+            <a:pPr algn="l"/>
+            <a:r>
+              <a:rPr lang="en-US" altLang="zh-CN" sz="1400"/>
+              <a:t>	256	TTG	T</a:t>
+            </a:r>
+            <a:r>
+              <a:rPr lang="zh-CN" altLang="en-US" sz="1400"/>
+              <a:t>，</a:t>
+            </a:r>
+            <a:r>
+              <a:rPr lang="en-US" altLang="zh-CN" sz="1400"/>
+              <a:t>CCC</a:t>
+            </a:r>
+          </a:p>
+          <a:p>
+            <a:pPr algn="l"/>
+            <a:r>
+              <a:rPr lang="en-US" altLang="zh-CN" sz="1400"/>
+              <a:t>	259	G	TT</a:t>
+            </a:r>
+            <a:r>
+              <a:rPr lang="zh-CN" altLang="en-US" sz="1400"/>
+              <a:t>，</a:t>
+            </a:r>
+            <a:r>
+              <a:rPr lang="en-US" altLang="zh-CN" sz="1400"/>
+              <a:t>C</a:t>
+            </a:r>
+          </a:p>
+          <a:p>
+            <a:pPr algn="l"/>
+            <a:r>
+              <a:rPr lang="en-US" altLang="zh-CN" sz="1400"/>
+              <a:t>	2. </a:t>
+            </a:r>
+            <a:r>
+              <a:rPr lang="zh-CN" altLang="en-US" sz="1400"/>
+              <a:t>对于邻近的几个变异，当它们可以通过组合形成一串更长的变异时，要如何重构这部分区域的参考基因组？暂时忽略，之后当作特殊情况加一个流程处理</a:t>
+            </a:r>
+            <a:r>
+              <a:rPr lang="en-US" altLang="zh-CN" sz="1400"/>
+              <a:t>0</a:t>
+            </a:r>
+            <a:r>
+              <a:rPr lang="zh-CN" altLang="en-US" sz="1400"/>
+              <a:t>？</a:t>
+            </a:r>
+            <a:endParaRPr lang="en-US" altLang="zh-CN" sz="1400"/>
+          </a:p>
+        </p:txBody>
+      </p:sp>
+    </p:spTree>
+    <p:extLst>
+      <p:ext uri="{BB962C8B-B14F-4D97-AF65-F5344CB8AC3E}">
+        <p14:creationId xmlns:p14="http://schemas.microsoft.com/office/powerpoint/2010/main" val="2193913016"/>
+      </p:ext>
+    </p:extLst>
+  </p:cSld>
+  <p:clrMapOvr>
+    <a:masterClrMapping/>
+  </p:clrMapOvr>
+</p:sld>
+</file>
+
+<file path=ppt/slides/slide6.xml><?xml version="1.0" encoding="utf-8"?>
+<p:sld xmlns:a="http://schemas.openxmlformats.org/drawingml/2006/main" xmlns:r="http://schemas.openxmlformats.org/officeDocument/2006/relationships" xmlns:p="http://schemas.openxmlformats.org/presentationml/2006/main">
+  <p:cSld>
+    <p:spTree>
+      <p:nvGrpSpPr>
+        <p:cNvPr id="1" name=""/>
+        <p:cNvGrpSpPr/>
+        <p:nvPr/>
+      </p:nvGrpSpPr>
+      <p:grpSpPr>
+        <a:xfrm>
+          <a:off x="0" y="0"/>
+          <a:ext cx="0" cy="0"/>
+          <a:chOff x="0" y="0"/>
+          <a:chExt cx="0" cy="0"/>
+        </a:xfrm>
+      </p:grpSpPr>
+      <p:sp>
+        <p:nvSpPr>
+          <p:cNvPr id="3" name="副标题 2">
+            <a:extLst>
+              <a:ext uri="{FF2B5EF4-FFF2-40B4-BE49-F238E27FC236}">
+                <a16:creationId xmlns:a16="http://schemas.microsoft.com/office/drawing/2014/main" id="{4A4A1D41-6478-43D2-B5BE-6EA9664B7338}"/>
+              </a:ext>
+            </a:extLst>
+          </p:cNvPr>
+          <p:cNvSpPr>
+            <a:spLocks noGrp="1"/>
+          </p:cNvSpPr>
+          <p:nvPr>
+            <p:ph type="subTitle" idx="1"/>
+          </p:nvPr>
+        </p:nvSpPr>
+        <p:spPr>
+          <a:xfrm>
+            <a:off x="-1" y="0"/>
             <a:ext cx="5582195" cy="424732"/>
           </a:xfrm>
         </p:spPr>
@@ -6421,7 +7564,7 @@
         </p:nvSpPr>
         <p:spPr>
           <a:xfrm>
-            <a:off x="8412478" y="842127"/>
+            <a:off x="6357255" y="212366"/>
             <a:ext cx="2669177" cy="608372"/>
           </a:xfrm>
           <a:prstGeom prst="rect">
@@ -6633,8 +7776,8 @@
         </p:nvSpPr>
         <p:spPr>
           <a:xfrm>
-            <a:off x="-1" y="2259329"/>
-            <a:ext cx="4206241" cy="3770263"/>
+            <a:off x="0" y="1653700"/>
+            <a:ext cx="4206241" cy="3707682"/>
           </a:xfrm>
           <a:prstGeom prst="rect">
             <a:avLst/>
@@ -6812,19 +7955,7 @@
             <a:pPr algn="l"/>
             <a:r>
               <a:rPr lang="zh-CN" altLang="en-US" sz="1400"/>
-              <a:t>关于如何实现的设计</a:t>
-            </a:r>
-            <a:endParaRPr lang="en-US" altLang="zh-CN" sz="1400"/>
-          </a:p>
-          <a:p>
-            <a:pPr algn="l"/>
-            <a:endParaRPr lang="en-US" altLang="zh-CN" sz="1400"/>
-          </a:p>
-          <a:p>
-            <a:pPr algn="l"/>
-            <a:r>
-              <a:rPr lang="zh-CN" altLang="en-US" sz="1400"/>
-              <a:t>简单思路整理：</a:t>
+              <a:t>简单的思路整理：</a:t>
             </a:r>
             <a:endParaRPr lang="en-US" altLang="zh-CN" sz="1400"/>
           </a:p>
@@ -6836,7 +7967,7 @@
             </a:r>
             <a:r>
               <a:rPr lang="zh-CN" altLang="en-US" sz="1400"/>
-              <a:t>因为步骤要用到，所以计划自己实现，然后将重构得到的新的参考基因组输出，或者是仅仅保留在内存中，二者均可，但是目前暂且只保留在内存中。</a:t>
+              <a:t>之前有一段时间纠结这个阶段的任务内容，总觉得这个“分情况”有点歧义的感觉，采用“采取不同策略”或许会更合适些。</a:t>
             </a:r>
             <a:endParaRPr lang="en-US" altLang="zh-CN" sz="1400"/>
           </a:p>
@@ -6848,7 +7979,39 @@
             </a:r>
             <a:r>
               <a:rPr lang="zh-CN" altLang="en-US" sz="1400"/>
-              <a:t>因为要修改参考基因组结构，所以要为它建立相应的数据结构以高效存储和访问参考基因组。</a:t>
+              <a:t>任务内容还是要解决比对结果差的</a:t>
+            </a:r>
+            <a:r>
+              <a:rPr lang="en-US" altLang="zh-CN" sz="1400"/>
+              <a:t>reads</a:t>
+            </a:r>
+            <a:r>
+              <a:rPr lang="zh-CN" altLang="en-US" sz="1400"/>
+              <a:t>的比对的，不过首先要确定“比对结果差的</a:t>
+            </a:r>
+            <a:r>
+              <a:rPr lang="en-US" altLang="zh-CN" sz="1400"/>
+              <a:t>reads</a:t>
+            </a:r>
+            <a:r>
+              <a:rPr lang="zh-CN" altLang="en-US" sz="1400"/>
+              <a:t>”究竟是什么样子的</a:t>
+            </a:r>
+            <a:r>
+              <a:rPr lang="en-US" altLang="zh-CN" sz="1400"/>
+              <a:t>reads</a:t>
+            </a:r>
+            <a:r>
+              <a:rPr lang="zh-CN" altLang="en-US" sz="1400"/>
+              <a:t>。对这个问题我没什么把握，直觉上是认为那种一大堆插入删除的可以算是比对结果差的</a:t>
+            </a:r>
+            <a:r>
+              <a:rPr lang="en-US" altLang="zh-CN" sz="1400"/>
+              <a:t>reads</a:t>
+            </a:r>
+            <a:r>
+              <a:rPr lang="zh-CN" altLang="en-US" sz="1400"/>
+              <a:t>。</a:t>
             </a:r>
             <a:endParaRPr lang="en-US" altLang="zh-CN" sz="1400"/>
           </a:p>
@@ -6860,23 +8023,31 @@
             </a:r>
             <a:r>
               <a:rPr lang="zh-CN" altLang="en-US" sz="1400"/>
-              <a:t>变异数据的读取可以使用</a:t>
+              <a:t>另外，在这一步之前，首先需要获取</a:t>
             </a:r>
             <a:r>
               <a:rPr lang="en-US" altLang="zh-CN" sz="1400"/>
-              <a:t>htslib</a:t>
+              <a:t>reads</a:t>
             </a:r>
             <a:r>
               <a:rPr lang="zh-CN" altLang="en-US" sz="1400"/>
-              <a:t>提供的</a:t>
+              <a:t>的比对结果，也就是要对测序数据和参考基因组进行比对，然后获取</a:t>
             </a:r>
             <a:r>
               <a:rPr lang="en-US" altLang="zh-CN" sz="1400"/>
-              <a:t>api</a:t>
+              <a:t>sam</a:t>
             </a:r>
             <a:r>
               <a:rPr lang="zh-CN" altLang="en-US" sz="1400"/>
-              <a:t>，之后自己实现把所有变异数据整理好。</a:t>
+              <a:t>格式的比对结果。这个步骤已经确定了，可以借助</a:t>
+            </a:r>
+            <a:r>
+              <a:rPr lang="en-US" altLang="zh-CN" sz="1400"/>
+              <a:t>bwa</a:t>
+            </a:r>
+            <a:r>
+              <a:rPr lang="zh-CN" altLang="en-US" sz="1400"/>
+              <a:t>等比对软件来实现。但是这样子的话，有一些步骤的实现就需要重新考虑了</a:t>
             </a:r>
             <a:endParaRPr lang="en-US" altLang="zh-CN" sz="1400"/>
           </a:p>
@@ -6884,13 +8055,16 @@
             <a:pPr algn="l"/>
             <a:r>
               <a:rPr lang="en-US" altLang="zh-CN" sz="1400"/>
-              <a:t>	</a:t>
+              <a:t>	【</a:t>
             </a:r>
             <a:r>
               <a:rPr lang="zh-CN" altLang="en-US" sz="1400"/>
-              <a:t>对参考基因组的局部区域重构需要将前面获取的数据结合起来，这里要自己实现，但是具体的重构策略需要设计，不过这一部分和后面的有些关联，所以重构策略留到后面解决。</a:t>
-            </a:r>
-            <a:endParaRPr lang="en-US" altLang="zh-CN" sz="1400"/>
+              <a:t>待考虑</a:t>
+            </a:r>
+            <a:r>
+              <a:rPr lang="en-US" altLang="zh-CN" sz="1400"/>
+              <a:t>】</a:t>
+            </a:r>
           </a:p>
         </p:txBody>
       </p:sp>
@@ -6908,7 +8082,7 @@
         </p:nvSpPr>
         <p:spPr>
           <a:xfrm>
-            <a:off x="4638838" y="2947737"/>
+            <a:off x="4206241" y="2819496"/>
             <a:ext cx="673849" cy="591095"/>
           </a:xfrm>
           <a:prstGeom prst="stripedRightArrow">
@@ -6954,10 +8128,10 @@
       </p:sp>
       <p:sp>
         <p:nvSpPr>
-          <p:cNvPr id="13" name="副标题 2">
-            <a:extLst>
-              <a:ext uri="{FF2B5EF4-FFF2-40B4-BE49-F238E27FC236}">
-                <a16:creationId xmlns:a16="http://schemas.microsoft.com/office/drawing/2014/main" id="{EF4F658A-2083-4F56-AA51-2F549CCE9FF3}"/>
+          <p:cNvPr id="14" name="副标题 2">
+            <a:extLst>
+              <a:ext uri="{FF2B5EF4-FFF2-40B4-BE49-F238E27FC236}">
+                <a16:creationId xmlns:a16="http://schemas.microsoft.com/office/drawing/2014/main" id="{32EC4F6F-67A9-4A89-A6BC-13EC22EEF5FF}"/>
               </a:ext>
             </a:extLst>
           </p:cNvPr>
@@ -6968,8 +8142,8 @@
         </p:nvSpPr>
         <p:spPr>
           <a:xfrm>
-            <a:off x="5745285" y="2681079"/>
-            <a:ext cx="4206241" cy="1124410"/>
+            <a:off x="5424216" y="1252928"/>
+            <a:ext cx="1848395" cy="286232"/>
           </a:xfrm>
           <a:prstGeom prst="rect">
             <a:avLst/>
@@ -7144,52 +8318,1235 @@
             </a:lvl9pPr>
           </a:lstStyle>
           <a:p>
-            <a:pPr algn="l"/>
             <a:r>
               <a:rPr lang="zh-CN" altLang="en-US" sz="1400"/>
-              <a:t>（思路整理的结果</a:t>
-            </a:r>
-            <a:r>
-              <a:rPr lang="en-US" altLang="zh-CN" sz="1400"/>
-              <a:t>/</a:t>
-            </a:r>
-            <a:r>
-              <a:rPr lang="zh-CN" altLang="en-US" sz="1400"/>
-              <a:t>需要实现的内容）</a:t>
-            </a:r>
-            <a:endParaRPr lang="en-US" altLang="zh-CN" sz="1400"/>
-          </a:p>
-          <a:p>
-            <a:pPr algn="l"/>
-            <a:r>
-              <a:rPr lang="en-US" altLang="zh-CN" sz="1400"/>
-              <a:t>- </a:t>
-            </a:r>
-            <a:r>
-              <a:rPr lang="zh-CN" altLang="en-US" sz="1400"/>
-              <a:t>参考基因组的存储和索引结构</a:t>
-            </a:r>
-            <a:endParaRPr lang="en-US" altLang="zh-CN" sz="1400"/>
-          </a:p>
-          <a:p>
-            <a:pPr algn="l"/>
-            <a:r>
-              <a:rPr lang="en-US" altLang="zh-CN" sz="1400"/>
-              <a:t>- </a:t>
-            </a:r>
-            <a:r>
-              <a:rPr lang="zh-CN" altLang="en-US" sz="1400"/>
-              <a:t>变异数据的存储结构（实际上只是对通过</a:t>
-            </a:r>
-            <a:r>
-              <a:rPr lang="en-US" altLang="zh-CN" sz="1400"/>
-              <a:t>htslib</a:t>
-            </a:r>
-            <a:r>
-              <a:rPr lang="zh-CN" altLang="en-US" sz="1400"/>
-              <a:t>获取的数据的整理和组织）</a:t>
-            </a:r>
-            <a:endParaRPr lang="en-US" altLang="zh-CN" sz="1400"/>
+              <a:t>整体的处理流程</a:t>
+            </a:r>
+          </a:p>
+        </p:txBody>
+      </p:sp>
+      <p:sp>
+        <p:nvSpPr>
+          <p:cNvPr id="15" name="流程图: 多文档 14">
+            <a:extLst>
+              <a:ext uri="{FF2B5EF4-FFF2-40B4-BE49-F238E27FC236}">
+                <a16:creationId xmlns:a16="http://schemas.microsoft.com/office/drawing/2014/main" id="{8379CDDD-2871-4D1A-AFAB-1111F98DC112}"/>
+              </a:ext>
+            </a:extLst>
+          </p:cNvPr>
+          <p:cNvSpPr/>
+          <p:nvPr/>
+        </p:nvSpPr>
+        <p:spPr>
+          <a:xfrm>
+            <a:off x="5142590" y="4925657"/>
+            <a:ext cx="1140808" cy="752299"/>
+          </a:xfrm>
+          <a:prstGeom prst="flowChartMultidocument">
+            <a:avLst/>
+          </a:prstGeom>
+        </p:spPr>
+        <p:style>
+          <a:lnRef idx="2">
+            <a:schemeClr val="accent1"/>
+          </a:lnRef>
+          <a:fillRef idx="1">
+            <a:schemeClr val="lt1"/>
+          </a:fillRef>
+          <a:effectRef idx="0">
+            <a:schemeClr val="accent1"/>
+          </a:effectRef>
+          <a:fontRef idx="minor">
+            <a:schemeClr val="dk1"/>
+          </a:fontRef>
+        </p:style>
+        <p:txBody>
+          <a:bodyPr rtlCol="0" anchor="ctr"/>
+          <a:lstStyle/>
+          <a:p>
+            <a:pPr algn="ctr"/>
+            <a:r>
+              <a:rPr lang="zh-CN" altLang="en-US" sz="1200">
+                <a:latin typeface="Consolas" panose="020B0609020204030204" pitchFamily="49" charset="0"/>
+                <a:ea typeface="微软雅黑" panose="020B0503020204020204" pitchFamily="34" charset="-122"/>
+              </a:rPr>
+              <a:t>比对结果</a:t>
+            </a:r>
+            <a:endParaRPr lang="en-US" altLang="zh-CN" sz="1200">
+              <a:latin typeface="Consolas" panose="020B0609020204030204" pitchFamily="49" charset="0"/>
+              <a:ea typeface="微软雅黑" panose="020B0503020204020204" pitchFamily="34" charset="-122"/>
+            </a:endParaRPr>
+          </a:p>
+        </p:txBody>
+      </p:sp>
+      <p:sp>
+        <p:nvSpPr>
+          <p:cNvPr id="16" name="流程图: 多文档 15">
+            <a:extLst>
+              <a:ext uri="{FF2B5EF4-FFF2-40B4-BE49-F238E27FC236}">
+                <a16:creationId xmlns:a16="http://schemas.microsoft.com/office/drawing/2014/main" id="{7EAF9922-D365-4853-8974-78E83EBD1D39}"/>
+              </a:ext>
+            </a:extLst>
+          </p:cNvPr>
+          <p:cNvSpPr/>
+          <p:nvPr/>
+        </p:nvSpPr>
+        <p:spPr>
+          <a:xfrm>
+            <a:off x="5712764" y="2154935"/>
+            <a:ext cx="989213" cy="752299"/>
+          </a:xfrm>
+          <a:prstGeom prst="flowChartMultidocument">
+            <a:avLst/>
+          </a:prstGeom>
+        </p:spPr>
+        <p:style>
+          <a:lnRef idx="2">
+            <a:schemeClr val="accent1"/>
+          </a:lnRef>
+          <a:fillRef idx="1">
+            <a:schemeClr val="lt1"/>
+          </a:fillRef>
+          <a:effectRef idx="0">
+            <a:schemeClr val="accent1"/>
+          </a:effectRef>
+          <a:fontRef idx="minor">
+            <a:schemeClr val="dk1"/>
+          </a:fontRef>
+        </p:style>
+        <p:txBody>
+          <a:bodyPr rtlCol="0" anchor="ctr"/>
+          <a:lstStyle/>
+          <a:p>
+            <a:pPr algn="ctr"/>
+            <a:r>
+              <a:rPr lang="zh-CN" altLang="en-US" sz="1200">
+                <a:latin typeface="Consolas" panose="020B0609020204030204" pitchFamily="49" charset="0"/>
+                <a:ea typeface="微软雅黑" panose="020B0503020204020204" pitchFamily="34" charset="-122"/>
+              </a:rPr>
+              <a:t>测序数据</a:t>
+            </a:r>
+            <a:endParaRPr lang="en-US" altLang="zh-CN" sz="1200">
+              <a:latin typeface="Consolas" panose="020B0609020204030204" pitchFamily="49" charset="0"/>
+              <a:ea typeface="微软雅黑" panose="020B0503020204020204" pitchFamily="34" charset="-122"/>
+            </a:endParaRPr>
+          </a:p>
+        </p:txBody>
+      </p:sp>
+      <p:sp>
+        <p:nvSpPr>
+          <p:cNvPr id="17" name="流程图: 多文档 16">
+            <a:extLst>
+              <a:ext uri="{FF2B5EF4-FFF2-40B4-BE49-F238E27FC236}">
+                <a16:creationId xmlns:a16="http://schemas.microsoft.com/office/drawing/2014/main" id="{44B9B1A4-1B47-49F7-801C-BEB8AC469346}"/>
+              </a:ext>
+            </a:extLst>
+          </p:cNvPr>
+          <p:cNvSpPr/>
+          <p:nvPr/>
+        </p:nvSpPr>
+        <p:spPr>
+          <a:xfrm>
+            <a:off x="9966241" y="2154935"/>
+            <a:ext cx="989213" cy="752299"/>
+          </a:xfrm>
+          <a:prstGeom prst="flowChartMultidocument">
+            <a:avLst/>
+          </a:prstGeom>
+        </p:spPr>
+        <p:style>
+          <a:lnRef idx="2">
+            <a:schemeClr val="accent1"/>
+          </a:lnRef>
+          <a:fillRef idx="1">
+            <a:schemeClr val="lt1"/>
+          </a:fillRef>
+          <a:effectRef idx="0">
+            <a:schemeClr val="accent1"/>
+          </a:effectRef>
+          <a:fontRef idx="minor">
+            <a:schemeClr val="dk1"/>
+          </a:fontRef>
+        </p:style>
+        <p:txBody>
+          <a:bodyPr rtlCol="0" anchor="ctr"/>
+          <a:lstStyle/>
+          <a:p>
+            <a:pPr algn="ctr"/>
+            <a:r>
+              <a:rPr lang="zh-CN" altLang="en-US" sz="1200">
+                <a:latin typeface="Consolas" panose="020B0609020204030204" pitchFamily="49" charset="0"/>
+                <a:ea typeface="微软雅黑" panose="020B0503020204020204" pitchFamily="34" charset="-122"/>
+              </a:rPr>
+              <a:t>变异数据</a:t>
+            </a:r>
+            <a:endParaRPr lang="en-US" altLang="zh-CN" sz="1200">
+              <a:latin typeface="Consolas" panose="020B0609020204030204" pitchFamily="49" charset="0"/>
+              <a:ea typeface="微软雅黑" panose="020B0503020204020204" pitchFamily="34" charset="-122"/>
+            </a:endParaRPr>
+          </a:p>
+        </p:txBody>
+      </p:sp>
+      <p:sp>
+        <p:nvSpPr>
+          <p:cNvPr id="18" name="流程图: 磁盘 17">
+            <a:extLst>
+              <a:ext uri="{FF2B5EF4-FFF2-40B4-BE49-F238E27FC236}">
+                <a16:creationId xmlns:a16="http://schemas.microsoft.com/office/drawing/2014/main" id="{D156F237-A351-42AF-BCC7-B4ED9AF51F8C}"/>
+              </a:ext>
+            </a:extLst>
+          </p:cNvPr>
+          <p:cNvSpPr/>
+          <p:nvPr/>
+        </p:nvSpPr>
+        <p:spPr>
+          <a:xfrm>
+            <a:off x="7844766" y="820738"/>
+            <a:ext cx="1245377" cy="871451"/>
+          </a:xfrm>
+          <a:prstGeom prst="flowChartMagneticDisk">
+            <a:avLst/>
+          </a:prstGeom>
+        </p:spPr>
+        <p:style>
+          <a:lnRef idx="2">
+            <a:schemeClr val="accent1"/>
+          </a:lnRef>
+          <a:fillRef idx="1">
+            <a:schemeClr val="lt1"/>
+          </a:fillRef>
+          <a:effectRef idx="0">
+            <a:schemeClr val="accent1"/>
+          </a:effectRef>
+          <a:fontRef idx="minor">
+            <a:schemeClr val="dk1"/>
+          </a:fontRef>
+        </p:style>
+        <p:txBody>
+          <a:bodyPr rtlCol="0" anchor="ctr"/>
+          <a:lstStyle/>
+          <a:p>
+            <a:pPr algn="ctr"/>
+            <a:r>
+              <a:rPr lang="en-US" altLang="zh-CN" sz="1200">
+                <a:solidFill>
+                  <a:schemeClr val="dk1"/>
+                </a:solidFill>
+                <a:latin typeface="Consolas" panose="020B0609020204030204" pitchFamily="49" charset="0"/>
+                <a:ea typeface="微软雅黑" panose="020B0503020204020204" pitchFamily="34" charset="-122"/>
+              </a:rPr>
+              <a:t>NCBI</a:t>
+            </a:r>
+            <a:r>
+              <a:rPr lang="zh-CN" altLang="en-US" sz="1200">
+                <a:solidFill>
+                  <a:schemeClr val="dk1"/>
+                </a:solidFill>
+                <a:latin typeface="Consolas" panose="020B0609020204030204" pitchFamily="49" charset="0"/>
+                <a:ea typeface="微软雅黑" panose="020B0503020204020204" pitchFamily="34" charset="-122"/>
+              </a:rPr>
+              <a:t>等数据库</a:t>
+            </a:r>
+          </a:p>
+        </p:txBody>
+      </p:sp>
+      <p:cxnSp>
+        <p:nvCxnSpPr>
+          <p:cNvPr id="19" name="连接符: 肘形 18">
+            <a:extLst>
+              <a:ext uri="{FF2B5EF4-FFF2-40B4-BE49-F238E27FC236}">
+                <a16:creationId xmlns:a16="http://schemas.microsoft.com/office/drawing/2014/main" id="{E0A881CB-9B63-4857-BF79-D0DDB4E8E25B}"/>
+              </a:ext>
+            </a:extLst>
+          </p:cNvPr>
+          <p:cNvCxnSpPr>
+            <a:cxnSpLocks/>
+            <a:stCxn id="18" idx="3"/>
+            <a:endCxn id="16" idx="0"/>
+          </p:cNvCxnSpPr>
+          <p:nvPr/>
+        </p:nvCxnSpPr>
+        <p:spPr>
+          <a:xfrm rot="5400000">
+            <a:off x="7140067" y="827547"/>
+            <a:ext cx="462746" cy="2192030"/>
+          </a:xfrm>
+          <a:prstGeom prst="bentConnector3">
+            <a:avLst>
+              <a:gd name="adj1" fmla="val 50000"/>
+            </a:avLst>
+          </a:prstGeom>
+          <a:ln>
+            <a:tailEnd type="triangle"/>
+          </a:ln>
+        </p:spPr>
+        <p:style>
+          <a:lnRef idx="1">
+            <a:schemeClr val="accent1"/>
+          </a:lnRef>
+          <a:fillRef idx="0">
+            <a:schemeClr val="accent1"/>
+          </a:fillRef>
+          <a:effectRef idx="0">
+            <a:schemeClr val="accent1"/>
+          </a:effectRef>
+          <a:fontRef idx="minor">
+            <a:schemeClr val="tx1"/>
+          </a:fontRef>
+        </p:style>
+      </p:cxnSp>
+      <p:cxnSp>
+        <p:nvCxnSpPr>
+          <p:cNvPr id="20" name="连接符: 肘形 19">
+            <a:extLst>
+              <a:ext uri="{FF2B5EF4-FFF2-40B4-BE49-F238E27FC236}">
+                <a16:creationId xmlns:a16="http://schemas.microsoft.com/office/drawing/2014/main" id="{31020350-5F25-4AF6-B627-2DA91594AB63}"/>
+              </a:ext>
+            </a:extLst>
+          </p:cNvPr>
+          <p:cNvCxnSpPr>
+            <a:cxnSpLocks/>
+            <a:stCxn id="18" idx="3"/>
+            <a:endCxn id="17" idx="0"/>
+          </p:cNvCxnSpPr>
+          <p:nvPr/>
+        </p:nvCxnSpPr>
+        <p:spPr>
+          <a:xfrm rot="16200000" flipH="1">
+            <a:off x="9266805" y="892838"/>
+            <a:ext cx="462746" cy="2061447"/>
+          </a:xfrm>
+          <a:prstGeom prst="bentConnector3">
+            <a:avLst>
+              <a:gd name="adj1" fmla="val 50000"/>
+            </a:avLst>
+          </a:prstGeom>
+          <a:ln>
+            <a:tailEnd type="triangle"/>
+          </a:ln>
+        </p:spPr>
+        <p:style>
+          <a:lnRef idx="1">
+            <a:schemeClr val="accent1"/>
+          </a:lnRef>
+          <a:fillRef idx="0">
+            <a:schemeClr val="accent1"/>
+          </a:fillRef>
+          <a:effectRef idx="0">
+            <a:schemeClr val="accent1"/>
+          </a:effectRef>
+          <a:fontRef idx="minor">
+            <a:schemeClr val="tx1"/>
+          </a:fontRef>
+        </p:style>
+      </p:cxnSp>
+      <p:sp>
+        <p:nvSpPr>
+          <p:cNvPr id="21" name="流程图: 文档 20">
+            <a:extLst>
+              <a:ext uri="{FF2B5EF4-FFF2-40B4-BE49-F238E27FC236}">
+                <a16:creationId xmlns:a16="http://schemas.microsoft.com/office/drawing/2014/main" id="{CC02C810-2B66-496A-9DF9-ED85CF4B54F5}"/>
+              </a:ext>
+            </a:extLst>
+          </p:cNvPr>
+          <p:cNvSpPr/>
+          <p:nvPr/>
+        </p:nvSpPr>
+        <p:spPr>
+          <a:xfrm>
+            <a:off x="7859751" y="2283780"/>
+            <a:ext cx="989213" cy="623455"/>
+          </a:xfrm>
+          <a:prstGeom prst="flowChartDocument">
+            <a:avLst/>
+          </a:prstGeom>
+        </p:spPr>
+        <p:style>
+          <a:lnRef idx="2">
+            <a:schemeClr val="accent1"/>
+          </a:lnRef>
+          <a:fillRef idx="1">
+            <a:schemeClr val="lt1"/>
+          </a:fillRef>
+          <a:effectRef idx="0">
+            <a:schemeClr val="accent1"/>
+          </a:effectRef>
+          <a:fontRef idx="minor">
+            <a:schemeClr val="dk1"/>
+          </a:fontRef>
+        </p:style>
+        <p:txBody>
+          <a:bodyPr rtlCol="0" anchor="ctr"/>
+          <a:lstStyle/>
+          <a:p>
+            <a:pPr algn="ctr"/>
+            <a:r>
+              <a:rPr lang="zh-CN" altLang="en-US" sz="1200">
+                <a:solidFill>
+                  <a:schemeClr val="dk1"/>
+                </a:solidFill>
+                <a:latin typeface="Consolas" panose="020B0609020204030204" pitchFamily="49" charset="0"/>
+                <a:ea typeface="微软雅黑" panose="020B0503020204020204" pitchFamily="34" charset="-122"/>
+              </a:rPr>
+              <a:t>参考基因组</a:t>
+            </a:r>
+          </a:p>
+        </p:txBody>
+      </p:sp>
+      <p:cxnSp>
+        <p:nvCxnSpPr>
+          <p:cNvPr id="22" name="连接符: 肘形 21">
+            <a:extLst>
+              <a:ext uri="{FF2B5EF4-FFF2-40B4-BE49-F238E27FC236}">
+                <a16:creationId xmlns:a16="http://schemas.microsoft.com/office/drawing/2014/main" id="{74769D23-1FBD-4964-B6A5-A3AC80F8F59F}"/>
+              </a:ext>
+            </a:extLst>
+          </p:cNvPr>
+          <p:cNvCxnSpPr>
+            <a:cxnSpLocks/>
+            <a:stCxn id="18" idx="3"/>
+            <a:endCxn id="21" idx="0"/>
+          </p:cNvCxnSpPr>
+          <p:nvPr/>
+        </p:nvCxnSpPr>
+        <p:spPr>
+          <a:xfrm rot="5400000">
+            <a:off x="8115112" y="1931436"/>
+            <a:ext cx="591591" cy="113097"/>
+          </a:xfrm>
+          <a:prstGeom prst="bentConnector3">
+            <a:avLst>
+              <a:gd name="adj1" fmla="val 50000"/>
+            </a:avLst>
+          </a:prstGeom>
+          <a:ln>
+            <a:tailEnd type="triangle"/>
+          </a:ln>
+        </p:spPr>
+        <p:style>
+          <a:lnRef idx="1">
+            <a:schemeClr val="accent1"/>
+          </a:lnRef>
+          <a:fillRef idx="0">
+            <a:schemeClr val="accent1"/>
+          </a:fillRef>
+          <a:effectRef idx="0">
+            <a:schemeClr val="accent1"/>
+          </a:effectRef>
+          <a:fontRef idx="minor">
+            <a:schemeClr val="tx1"/>
+          </a:fontRef>
+        </p:style>
+      </p:cxnSp>
+      <p:cxnSp>
+        <p:nvCxnSpPr>
+          <p:cNvPr id="23" name="连接符: 肘形 22">
+            <a:extLst>
+              <a:ext uri="{FF2B5EF4-FFF2-40B4-BE49-F238E27FC236}">
+                <a16:creationId xmlns:a16="http://schemas.microsoft.com/office/drawing/2014/main" id="{D3D7F6F8-0011-4E3F-8A59-DC67E239E3C5}"/>
+              </a:ext>
+            </a:extLst>
+          </p:cNvPr>
+          <p:cNvCxnSpPr>
+            <a:cxnSpLocks/>
+            <a:stCxn id="16" idx="2"/>
+            <a:endCxn id="28" idx="0"/>
+          </p:cNvCxnSpPr>
+          <p:nvPr/>
+        </p:nvCxnSpPr>
+        <p:spPr>
+          <a:xfrm rot="16200000" flipH="1">
+            <a:off x="5929035" y="3088293"/>
+            <a:ext cx="887036" cy="467938"/>
+          </a:xfrm>
+          <a:prstGeom prst="bentConnector3">
+            <a:avLst>
+              <a:gd name="adj1" fmla="val 50000"/>
+            </a:avLst>
+          </a:prstGeom>
+          <a:ln>
+            <a:tailEnd type="triangle"/>
+          </a:ln>
+        </p:spPr>
+        <p:style>
+          <a:lnRef idx="1">
+            <a:schemeClr val="accent1"/>
+          </a:lnRef>
+          <a:fillRef idx="0">
+            <a:schemeClr val="accent1"/>
+          </a:fillRef>
+          <a:effectRef idx="0">
+            <a:schemeClr val="accent1"/>
+          </a:effectRef>
+          <a:fontRef idx="minor">
+            <a:schemeClr val="tx1"/>
+          </a:fontRef>
+        </p:style>
+      </p:cxnSp>
+      <p:cxnSp>
+        <p:nvCxnSpPr>
+          <p:cNvPr id="24" name="连接符: 肘形 23">
+            <a:extLst>
+              <a:ext uri="{FF2B5EF4-FFF2-40B4-BE49-F238E27FC236}">
+                <a16:creationId xmlns:a16="http://schemas.microsoft.com/office/drawing/2014/main" id="{3817370E-F3EE-4B7E-BE99-C8EB8463AA2D}"/>
+              </a:ext>
+            </a:extLst>
+          </p:cNvPr>
+          <p:cNvCxnSpPr>
+            <a:cxnSpLocks/>
+            <a:stCxn id="21" idx="2"/>
+            <a:endCxn id="28" idx="0"/>
+          </p:cNvCxnSpPr>
+          <p:nvPr/>
+        </p:nvCxnSpPr>
+        <p:spPr>
+          <a:xfrm rot="5400000">
+            <a:off x="7030559" y="2441981"/>
+            <a:ext cx="899762" cy="1747836"/>
+          </a:xfrm>
+          <a:prstGeom prst="bentConnector3">
+            <a:avLst>
+              <a:gd name="adj1" fmla="val 50000"/>
+            </a:avLst>
+          </a:prstGeom>
+          <a:ln>
+            <a:tailEnd type="triangle"/>
+          </a:ln>
+        </p:spPr>
+        <p:style>
+          <a:lnRef idx="1">
+            <a:schemeClr val="accent1"/>
+          </a:lnRef>
+          <a:fillRef idx="0">
+            <a:schemeClr val="accent1"/>
+          </a:fillRef>
+          <a:effectRef idx="0">
+            <a:schemeClr val="accent1"/>
+          </a:effectRef>
+          <a:fontRef idx="minor">
+            <a:schemeClr val="tx1"/>
+          </a:fontRef>
+        </p:style>
+      </p:cxnSp>
+      <p:cxnSp>
+        <p:nvCxnSpPr>
+          <p:cNvPr id="25" name="连接符: 肘形 24">
+            <a:extLst>
+              <a:ext uri="{FF2B5EF4-FFF2-40B4-BE49-F238E27FC236}">
+                <a16:creationId xmlns:a16="http://schemas.microsoft.com/office/drawing/2014/main" id="{3A71CFD5-6ABD-4199-8707-FEFB5BF7C8A5}"/>
+              </a:ext>
+            </a:extLst>
+          </p:cNvPr>
+          <p:cNvCxnSpPr>
+            <a:cxnSpLocks/>
+            <a:stCxn id="21" idx="2"/>
+            <a:endCxn id="27" idx="0"/>
+          </p:cNvCxnSpPr>
+          <p:nvPr/>
+        </p:nvCxnSpPr>
+        <p:spPr>
+          <a:xfrm rot="16200000" flipH="1">
+            <a:off x="8643986" y="2576390"/>
+            <a:ext cx="568209" cy="1147464"/>
+          </a:xfrm>
+          <a:prstGeom prst="bentConnector3">
+            <a:avLst>
+              <a:gd name="adj1" fmla="val 50000"/>
+            </a:avLst>
+          </a:prstGeom>
+          <a:ln>
+            <a:tailEnd type="triangle"/>
+          </a:ln>
+        </p:spPr>
+        <p:style>
+          <a:lnRef idx="1">
+            <a:schemeClr val="accent1"/>
+          </a:lnRef>
+          <a:fillRef idx="0">
+            <a:schemeClr val="accent1"/>
+          </a:fillRef>
+          <a:effectRef idx="0">
+            <a:schemeClr val="accent1"/>
+          </a:effectRef>
+          <a:fontRef idx="minor">
+            <a:schemeClr val="tx1"/>
+          </a:fontRef>
+        </p:style>
+      </p:cxnSp>
+      <p:cxnSp>
+        <p:nvCxnSpPr>
+          <p:cNvPr id="26" name="连接符: 肘形 25">
+            <a:extLst>
+              <a:ext uri="{FF2B5EF4-FFF2-40B4-BE49-F238E27FC236}">
+                <a16:creationId xmlns:a16="http://schemas.microsoft.com/office/drawing/2014/main" id="{263F9E5F-8729-47C6-A500-F8ADA2AC2C27}"/>
+              </a:ext>
+            </a:extLst>
+          </p:cNvPr>
+          <p:cNvCxnSpPr>
+            <a:cxnSpLocks/>
+            <a:stCxn id="17" idx="2"/>
+            <a:endCxn id="27" idx="0"/>
+          </p:cNvCxnSpPr>
+          <p:nvPr/>
+        </p:nvCxnSpPr>
+        <p:spPr>
+          <a:xfrm rot="5400000">
+            <a:off x="9669201" y="2711366"/>
+            <a:ext cx="555483" cy="890239"/>
+          </a:xfrm>
+          <a:prstGeom prst="bentConnector3">
+            <a:avLst>
+              <a:gd name="adj1" fmla="val 50000"/>
+            </a:avLst>
+          </a:prstGeom>
+          <a:ln>
+            <a:tailEnd type="triangle"/>
+          </a:ln>
+        </p:spPr>
+        <p:style>
+          <a:lnRef idx="1">
+            <a:schemeClr val="accent1"/>
+          </a:lnRef>
+          <a:fillRef idx="0">
+            <a:schemeClr val="accent1"/>
+          </a:fillRef>
+          <a:effectRef idx="0">
+            <a:schemeClr val="accent1"/>
+          </a:effectRef>
+          <a:fontRef idx="minor">
+            <a:schemeClr val="tx1"/>
+          </a:fontRef>
+        </p:style>
+      </p:cxnSp>
+      <p:sp>
+        <p:nvSpPr>
+          <p:cNvPr id="27" name="矩形 26">
+            <a:extLst>
+              <a:ext uri="{FF2B5EF4-FFF2-40B4-BE49-F238E27FC236}">
+                <a16:creationId xmlns:a16="http://schemas.microsoft.com/office/drawing/2014/main" id="{06207C68-C46B-4989-ADE9-FFA1B7D1E226}"/>
+              </a:ext>
+            </a:extLst>
+          </p:cNvPr>
+          <p:cNvSpPr/>
+          <p:nvPr/>
+        </p:nvSpPr>
+        <p:spPr>
+          <a:xfrm>
+            <a:off x="8743686" y="3434227"/>
+            <a:ext cx="1516271" cy="623455"/>
+          </a:xfrm>
+          <a:prstGeom prst="rect">
+            <a:avLst/>
+          </a:prstGeom>
+          <a:ln w="31750">
+            <a:prstDash val="dash"/>
+          </a:ln>
+        </p:spPr>
+        <p:style>
+          <a:lnRef idx="2">
+            <a:schemeClr val="accent1"/>
+          </a:lnRef>
+          <a:fillRef idx="1">
+            <a:schemeClr val="lt1"/>
+          </a:fillRef>
+          <a:effectRef idx="0">
+            <a:schemeClr val="accent1"/>
+          </a:effectRef>
+          <a:fontRef idx="minor">
+            <a:schemeClr val="dk1"/>
+          </a:fontRef>
+        </p:style>
+        <p:txBody>
+          <a:bodyPr rtlCol="0" anchor="ctr"/>
+          <a:lstStyle/>
+          <a:p>
+            <a:pPr algn="ctr"/>
+            <a:r>
+              <a:rPr lang="zh-CN" altLang="en-US" sz="1200">
+                <a:solidFill>
+                  <a:schemeClr val="dk1"/>
+                </a:solidFill>
+                <a:latin typeface="Consolas" panose="020B0609020204030204" pitchFamily="49" charset="0"/>
+                <a:ea typeface="微软雅黑" panose="020B0503020204020204" pitchFamily="34" charset="-122"/>
+              </a:rPr>
+              <a:t>选择性整合变异数据到参考基因组上</a:t>
+            </a:r>
+            <a:endParaRPr lang="en-US" altLang="zh-CN" sz="1200">
+              <a:solidFill>
+                <a:schemeClr val="dk1"/>
+              </a:solidFill>
+              <a:latin typeface="Consolas" panose="020B0609020204030204" pitchFamily="49" charset="0"/>
+              <a:ea typeface="微软雅黑" panose="020B0503020204020204" pitchFamily="34" charset="-122"/>
+            </a:endParaRPr>
+          </a:p>
+        </p:txBody>
+      </p:sp>
+      <p:sp>
+        <p:nvSpPr>
+          <p:cNvPr id="28" name="矩形 27">
+            <a:extLst>
+              <a:ext uri="{FF2B5EF4-FFF2-40B4-BE49-F238E27FC236}">
+                <a16:creationId xmlns:a16="http://schemas.microsoft.com/office/drawing/2014/main" id="{24835F4B-32ED-4687-ADA3-D0858B5A562A}"/>
+              </a:ext>
+            </a:extLst>
+          </p:cNvPr>
+          <p:cNvSpPr/>
+          <p:nvPr/>
+        </p:nvSpPr>
+        <p:spPr>
+          <a:xfrm>
+            <a:off x="6036118" y="3765780"/>
+            <a:ext cx="1140808" cy="623455"/>
+          </a:xfrm>
+          <a:prstGeom prst="rect">
+            <a:avLst/>
+          </a:prstGeom>
+        </p:spPr>
+        <p:style>
+          <a:lnRef idx="2">
+            <a:schemeClr val="accent1"/>
+          </a:lnRef>
+          <a:fillRef idx="1">
+            <a:schemeClr val="lt1"/>
+          </a:fillRef>
+          <a:effectRef idx="0">
+            <a:schemeClr val="accent1"/>
+          </a:effectRef>
+          <a:fontRef idx="minor">
+            <a:schemeClr val="dk1"/>
+          </a:fontRef>
+        </p:style>
+        <p:txBody>
+          <a:bodyPr rtlCol="0" anchor="ctr"/>
+          <a:lstStyle/>
+          <a:p>
+            <a:pPr algn="ctr"/>
+            <a:r>
+              <a:rPr lang="zh-CN" altLang="en-US" sz="1200">
+                <a:latin typeface="Consolas" panose="020B0609020204030204" pitchFamily="49" charset="0"/>
+                <a:ea typeface="微软雅黑" panose="020B0503020204020204" pitchFamily="34" charset="-122"/>
+              </a:rPr>
+              <a:t>利用</a:t>
+            </a:r>
+            <a:r>
+              <a:rPr lang="en-US" altLang="zh-CN" sz="1200">
+                <a:latin typeface="Consolas" panose="020B0609020204030204" pitchFamily="49" charset="0"/>
+                <a:ea typeface="微软雅黑" panose="020B0503020204020204" pitchFamily="34" charset="-122"/>
+              </a:rPr>
+              <a:t>BWA</a:t>
+            </a:r>
+            <a:r>
+              <a:rPr lang="zh-CN" altLang="en-US" sz="1200">
+                <a:latin typeface="Consolas" panose="020B0609020204030204" pitchFamily="49" charset="0"/>
+                <a:ea typeface="微软雅黑" panose="020B0503020204020204" pitchFamily="34" charset="-122"/>
+              </a:rPr>
+              <a:t>等工具比对</a:t>
+            </a:r>
+            <a:endParaRPr lang="en-US" altLang="zh-CN" sz="1200">
+              <a:solidFill>
+                <a:schemeClr val="dk1"/>
+              </a:solidFill>
+              <a:latin typeface="Consolas" panose="020B0609020204030204" pitchFamily="49" charset="0"/>
+              <a:ea typeface="微软雅黑" panose="020B0503020204020204" pitchFamily="34" charset="-122"/>
+            </a:endParaRPr>
+          </a:p>
+        </p:txBody>
+      </p:sp>
+      <p:cxnSp>
+        <p:nvCxnSpPr>
+          <p:cNvPr id="29" name="连接符: 肘形 28">
+            <a:extLst>
+              <a:ext uri="{FF2B5EF4-FFF2-40B4-BE49-F238E27FC236}">
+                <a16:creationId xmlns:a16="http://schemas.microsoft.com/office/drawing/2014/main" id="{F1977A29-3863-416A-B0CE-34587D6AD0B2}"/>
+              </a:ext>
+            </a:extLst>
+          </p:cNvPr>
+          <p:cNvCxnSpPr>
+            <a:cxnSpLocks/>
+            <a:stCxn id="28" idx="2"/>
+            <a:endCxn id="15" idx="0"/>
+          </p:cNvCxnSpPr>
+          <p:nvPr/>
+        </p:nvCxnSpPr>
+        <p:spPr>
+          <a:xfrm rot="5400000">
+            <a:off x="5930789" y="4249924"/>
+            <a:ext cx="536422" cy="815045"/>
+          </a:xfrm>
+          <a:prstGeom prst="bentConnector3">
+            <a:avLst>
+              <a:gd name="adj1" fmla="val 50000"/>
+            </a:avLst>
+          </a:prstGeom>
+          <a:ln>
+            <a:tailEnd type="triangle"/>
+          </a:ln>
+        </p:spPr>
+        <p:style>
+          <a:lnRef idx="1">
+            <a:schemeClr val="accent1"/>
+          </a:lnRef>
+          <a:fillRef idx="0">
+            <a:schemeClr val="accent1"/>
+          </a:fillRef>
+          <a:effectRef idx="0">
+            <a:schemeClr val="accent1"/>
+          </a:effectRef>
+          <a:fontRef idx="minor">
+            <a:schemeClr val="tx1"/>
+          </a:fontRef>
+        </p:style>
+      </p:cxnSp>
+      <p:cxnSp>
+        <p:nvCxnSpPr>
+          <p:cNvPr id="30" name="连接符: 肘形 29">
+            <a:extLst>
+              <a:ext uri="{FF2B5EF4-FFF2-40B4-BE49-F238E27FC236}">
+                <a16:creationId xmlns:a16="http://schemas.microsoft.com/office/drawing/2014/main" id="{205C2855-E2C2-4D28-A55B-0BADCE2F48FC}"/>
+              </a:ext>
+            </a:extLst>
+          </p:cNvPr>
+          <p:cNvCxnSpPr>
+            <a:cxnSpLocks/>
+            <a:stCxn id="27" idx="2"/>
+            <a:endCxn id="38" idx="0"/>
+          </p:cNvCxnSpPr>
+          <p:nvPr/>
+        </p:nvCxnSpPr>
+        <p:spPr>
+          <a:xfrm rot="16200000" flipH="1">
+            <a:off x="9682491" y="3877013"/>
+            <a:ext cx="331552" cy="692890"/>
+          </a:xfrm>
+          <a:prstGeom prst="bentConnector3">
+            <a:avLst>
+              <a:gd name="adj1" fmla="val 50000"/>
+            </a:avLst>
+          </a:prstGeom>
+          <a:ln>
+            <a:tailEnd type="triangle"/>
+          </a:ln>
+        </p:spPr>
+        <p:style>
+          <a:lnRef idx="1">
+            <a:schemeClr val="accent1"/>
+          </a:lnRef>
+          <a:fillRef idx="0">
+            <a:schemeClr val="accent1"/>
+          </a:fillRef>
+          <a:effectRef idx="0">
+            <a:schemeClr val="accent1"/>
+          </a:effectRef>
+          <a:fontRef idx="minor">
+            <a:schemeClr val="tx1"/>
+          </a:fontRef>
+        </p:style>
+      </p:cxnSp>
+      <p:cxnSp>
+        <p:nvCxnSpPr>
+          <p:cNvPr id="31" name="连接符: 肘形 30">
+            <a:extLst>
+              <a:ext uri="{FF2B5EF4-FFF2-40B4-BE49-F238E27FC236}">
+                <a16:creationId xmlns:a16="http://schemas.microsoft.com/office/drawing/2014/main" id="{E35804F0-E7BF-4888-93FD-D2427B93F4E5}"/>
+              </a:ext>
+            </a:extLst>
+          </p:cNvPr>
+          <p:cNvCxnSpPr>
+            <a:cxnSpLocks/>
+            <a:stCxn id="16" idx="3"/>
+            <a:endCxn id="28" idx="3"/>
+          </p:cNvCxnSpPr>
+          <p:nvPr/>
+        </p:nvCxnSpPr>
+        <p:spPr>
+          <a:xfrm>
+            <a:off x="6701977" y="2531085"/>
+            <a:ext cx="474949" cy="1546423"/>
+          </a:xfrm>
+          <a:prstGeom prst="bentConnector3">
+            <a:avLst>
+              <a:gd name="adj1" fmla="val 148131"/>
+            </a:avLst>
+          </a:prstGeom>
+          <a:ln w="57150" cmpd="sng">
+            <a:solidFill>
+              <a:srgbClr val="FF0000"/>
+            </a:solidFill>
+            <a:tailEnd type="triangle"/>
+          </a:ln>
+        </p:spPr>
+        <p:style>
+          <a:lnRef idx="1">
+            <a:schemeClr val="accent1"/>
+          </a:lnRef>
+          <a:fillRef idx="0">
+            <a:schemeClr val="accent1"/>
+          </a:fillRef>
+          <a:effectRef idx="0">
+            <a:schemeClr val="accent1"/>
+          </a:effectRef>
+          <a:fontRef idx="minor">
+            <a:schemeClr val="tx1"/>
+          </a:fontRef>
+        </p:style>
+      </p:cxnSp>
+      <p:cxnSp>
+        <p:nvCxnSpPr>
+          <p:cNvPr id="32" name="连接符: 肘形 31">
+            <a:extLst>
+              <a:ext uri="{FF2B5EF4-FFF2-40B4-BE49-F238E27FC236}">
+                <a16:creationId xmlns:a16="http://schemas.microsoft.com/office/drawing/2014/main" id="{CBFBCB8B-E399-4FC7-8F79-1D126570EC17}"/>
+              </a:ext>
+            </a:extLst>
+          </p:cNvPr>
+          <p:cNvCxnSpPr>
+            <a:cxnSpLocks/>
+            <a:stCxn id="38" idx="1"/>
+            <a:endCxn id="28" idx="3"/>
+          </p:cNvCxnSpPr>
+          <p:nvPr/>
+        </p:nvCxnSpPr>
+        <p:spPr>
+          <a:xfrm rot="10800000">
+            <a:off x="7176926" y="4077508"/>
+            <a:ext cx="2321252" cy="808370"/>
+          </a:xfrm>
+          <a:prstGeom prst="bentConnector3">
+            <a:avLst>
+              <a:gd name="adj1" fmla="val 50000"/>
+            </a:avLst>
+          </a:prstGeom>
+          <a:ln w="57150" cmpd="dbl">
+            <a:solidFill>
+              <a:srgbClr val="FF0000"/>
+            </a:solidFill>
+            <a:tailEnd type="triangle"/>
+          </a:ln>
+        </p:spPr>
+        <p:style>
+          <a:lnRef idx="1">
+            <a:schemeClr val="accent1"/>
+          </a:lnRef>
+          <a:fillRef idx="0">
+            <a:schemeClr val="accent1"/>
+          </a:fillRef>
+          <a:effectRef idx="0">
+            <a:schemeClr val="accent1"/>
+          </a:effectRef>
+          <a:fontRef idx="minor">
+            <a:schemeClr val="tx1"/>
+          </a:fontRef>
+        </p:style>
+      </p:cxnSp>
+      <p:sp>
+        <p:nvSpPr>
+          <p:cNvPr id="33" name="流程图: 多文档 32">
+            <a:extLst>
+              <a:ext uri="{FF2B5EF4-FFF2-40B4-BE49-F238E27FC236}">
+                <a16:creationId xmlns:a16="http://schemas.microsoft.com/office/drawing/2014/main" id="{70FDB7A4-B6EB-4262-B3B7-3FE2CD2CB508}"/>
+              </a:ext>
+            </a:extLst>
+          </p:cNvPr>
+          <p:cNvSpPr/>
+          <p:nvPr/>
+        </p:nvSpPr>
+        <p:spPr>
+          <a:xfrm>
+            <a:off x="7071689" y="4925656"/>
+            <a:ext cx="1140808" cy="752299"/>
+          </a:xfrm>
+          <a:prstGeom prst="flowChartMultidocument">
+            <a:avLst/>
+          </a:prstGeom>
+        </p:spPr>
+        <p:style>
+          <a:lnRef idx="2">
+            <a:schemeClr val="accent1"/>
+          </a:lnRef>
+          <a:fillRef idx="1">
+            <a:schemeClr val="lt1"/>
+          </a:fillRef>
+          <a:effectRef idx="0">
+            <a:schemeClr val="accent1"/>
+          </a:effectRef>
+          <a:fontRef idx="minor">
+            <a:schemeClr val="dk1"/>
+          </a:fontRef>
+        </p:style>
+        <p:txBody>
+          <a:bodyPr rtlCol="0" anchor="ctr"/>
+          <a:lstStyle/>
+          <a:p>
+            <a:pPr algn="ctr"/>
+            <a:r>
+              <a:rPr lang="zh-CN" altLang="en-US" sz="1200">
+                <a:latin typeface="Consolas" panose="020B0609020204030204" pitchFamily="49" charset="0"/>
+                <a:ea typeface="微软雅黑" panose="020B0503020204020204" pitchFamily="34" charset="-122"/>
+              </a:rPr>
+              <a:t>比对结果</a:t>
+            </a:r>
+            <a:r>
+              <a:rPr lang="zh-CN" altLang="en-US" sz="1200" b="1">
+                <a:latin typeface="Consolas" panose="020B0609020204030204" pitchFamily="49" charset="0"/>
+                <a:ea typeface="微软雅黑" panose="020B0503020204020204" pitchFamily="34" charset="-122"/>
+              </a:rPr>
+              <a:t>‘</a:t>
+            </a:r>
+            <a:endParaRPr lang="en-US" altLang="zh-CN" sz="1200" b="1">
+              <a:latin typeface="Consolas" panose="020B0609020204030204" pitchFamily="49" charset="0"/>
+              <a:ea typeface="微软雅黑" panose="020B0503020204020204" pitchFamily="34" charset="-122"/>
+            </a:endParaRPr>
+          </a:p>
+        </p:txBody>
+      </p:sp>
+      <p:sp>
+        <p:nvSpPr>
+          <p:cNvPr id="34" name="矩形 33">
+            <a:extLst>
+              <a:ext uri="{FF2B5EF4-FFF2-40B4-BE49-F238E27FC236}">
+                <a16:creationId xmlns:a16="http://schemas.microsoft.com/office/drawing/2014/main" id="{01FA8743-2ABF-4480-AC53-F05AF9EC736E}"/>
+              </a:ext>
+            </a:extLst>
+          </p:cNvPr>
+          <p:cNvSpPr/>
+          <p:nvPr/>
+        </p:nvSpPr>
+        <p:spPr>
+          <a:xfrm>
+            <a:off x="5756340" y="6080426"/>
+            <a:ext cx="1516271" cy="623455"/>
+          </a:xfrm>
+          <a:prstGeom prst="rect">
+            <a:avLst/>
+          </a:prstGeom>
+        </p:spPr>
+        <p:style>
+          <a:lnRef idx="2">
+            <a:schemeClr val="accent1"/>
+          </a:lnRef>
+          <a:fillRef idx="1">
+            <a:schemeClr val="lt1"/>
+          </a:fillRef>
+          <a:effectRef idx="0">
+            <a:schemeClr val="accent1"/>
+          </a:effectRef>
+          <a:fontRef idx="minor">
+            <a:schemeClr val="dk1"/>
+          </a:fontRef>
+        </p:style>
+        <p:txBody>
+          <a:bodyPr rtlCol="0" anchor="ctr"/>
+          <a:lstStyle/>
+          <a:p>
+            <a:pPr algn="ctr"/>
+            <a:r>
+              <a:rPr lang="zh-CN" altLang="en-US" sz="1200">
+                <a:solidFill>
+                  <a:schemeClr val="dk1"/>
+                </a:solidFill>
+                <a:latin typeface="Consolas" panose="020B0609020204030204" pitchFamily="49" charset="0"/>
+                <a:ea typeface="微软雅黑" panose="020B0503020204020204" pitchFamily="34" charset="-122"/>
+              </a:rPr>
+              <a:t>比较结果</a:t>
+            </a:r>
+            <a:endParaRPr lang="en-US" altLang="zh-CN" sz="1200">
+              <a:solidFill>
+                <a:schemeClr val="dk1"/>
+              </a:solidFill>
+              <a:latin typeface="Consolas" panose="020B0609020204030204" pitchFamily="49" charset="0"/>
+              <a:ea typeface="微软雅黑" panose="020B0503020204020204" pitchFamily="34" charset="-122"/>
+            </a:endParaRPr>
+          </a:p>
+        </p:txBody>
+      </p:sp>
+      <p:cxnSp>
+        <p:nvCxnSpPr>
+          <p:cNvPr id="35" name="连接符: 肘形 34">
+            <a:extLst>
+              <a:ext uri="{FF2B5EF4-FFF2-40B4-BE49-F238E27FC236}">
+                <a16:creationId xmlns:a16="http://schemas.microsoft.com/office/drawing/2014/main" id="{3545DD30-1D05-4A0A-877E-CEA2BD282D87}"/>
+              </a:ext>
+            </a:extLst>
+          </p:cNvPr>
+          <p:cNvCxnSpPr>
+            <a:cxnSpLocks/>
+            <a:stCxn id="15" idx="2"/>
+            <a:endCxn id="34" idx="0"/>
+          </p:cNvCxnSpPr>
+          <p:nvPr/>
+        </p:nvCxnSpPr>
+        <p:spPr>
+          <a:xfrm rot="16200000" flipH="1">
+            <a:off x="5858591" y="5424541"/>
+            <a:ext cx="430960" cy="880810"/>
+          </a:xfrm>
+          <a:prstGeom prst="bentConnector3">
+            <a:avLst>
+              <a:gd name="adj1" fmla="val 50000"/>
+            </a:avLst>
+          </a:prstGeom>
+          <a:ln>
+            <a:tailEnd type="triangle"/>
+          </a:ln>
+        </p:spPr>
+        <p:style>
+          <a:lnRef idx="1">
+            <a:schemeClr val="accent1"/>
+          </a:lnRef>
+          <a:fillRef idx="0">
+            <a:schemeClr val="accent1"/>
+          </a:fillRef>
+          <a:effectRef idx="0">
+            <a:schemeClr val="accent1"/>
+          </a:effectRef>
+          <a:fontRef idx="minor">
+            <a:schemeClr val="tx1"/>
+          </a:fontRef>
+        </p:style>
+      </p:cxnSp>
+      <p:cxnSp>
+        <p:nvCxnSpPr>
+          <p:cNvPr id="36" name="连接符: 肘形 35">
+            <a:extLst>
+              <a:ext uri="{FF2B5EF4-FFF2-40B4-BE49-F238E27FC236}">
+                <a16:creationId xmlns:a16="http://schemas.microsoft.com/office/drawing/2014/main" id="{7E3E18A2-20B8-4617-8589-0A8DB9C846C3}"/>
+              </a:ext>
+            </a:extLst>
+          </p:cNvPr>
+          <p:cNvCxnSpPr>
+            <a:cxnSpLocks/>
+            <a:stCxn id="33" idx="2"/>
+            <a:endCxn id="34" idx="0"/>
+          </p:cNvCxnSpPr>
+          <p:nvPr/>
+        </p:nvCxnSpPr>
+        <p:spPr>
+          <a:xfrm rot="5400000">
+            <a:off x="6823141" y="5340801"/>
+            <a:ext cx="430961" cy="1048289"/>
+          </a:xfrm>
+          <a:prstGeom prst="bentConnector3">
+            <a:avLst>
+              <a:gd name="adj1" fmla="val 50000"/>
+            </a:avLst>
+          </a:prstGeom>
+          <a:ln>
+            <a:tailEnd type="triangle"/>
+          </a:ln>
+        </p:spPr>
+        <p:style>
+          <a:lnRef idx="1">
+            <a:schemeClr val="accent1"/>
+          </a:lnRef>
+          <a:fillRef idx="0">
+            <a:schemeClr val="accent1"/>
+          </a:fillRef>
+          <a:effectRef idx="0">
+            <a:schemeClr val="accent1"/>
+          </a:effectRef>
+          <a:fontRef idx="minor">
+            <a:schemeClr val="tx1"/>
+          </a:fontRef>
+        </p:style>
+      </p:cxnSp>
+      <p:cxnSp>
+        <p:nvCxnSpPr>
+          <p:cNvPr id="37" name="连接符: 肘形 36">
+            <a:extLst>
+              <a:ext uri="{FF2B5EF4-FFF2-40B4-BE49-F238E27FC236}">
+                <a16:creationId xmlns:a16="http://schemas.microsoft.com/office/drawing/2014/main" id="{7F83F778-D8E3-4A45-9E3D-2E918E3C6D98}"/>
+              </a:ext>
+            </a:extLst>
+          </p:cNvPr>
+          <p:cNvCxnSpPr>
+            <a:cxnSpLocks/>
+            <a:stCxn id="28" idx="2"/>
+            <a:endCxn id="33" idx="0"/>
+          </p:cNvCxnSpPr>
+          <p:nvPr/>
+        </p:nvCxnSpPr>
+        <p:spPr>
+          <a:xfrm rot="16200000" flipH="1">
+            <a:off x="6895339" y="4100418"/>
+            <a:ext cx="536421" cy="1114054"/>
+          </a:xfrm>
+          <a:prstGeom prst="bentConnector3">
+            <a:avLst>
+              <a:gd name="adj1" fmla="val 50000"/>
+            </a:avLst>
+          </a:prstGeom>
+          <a:ln>
+            <a:solidFill>
+              <a:srgbClr val="FF0000"/>
+            </a:solidFill>
+            <a:tailEnd type="triangle"/>
+          </a:ln>
+        </p:spPr>
+        <p:style>
+          <a:lnRef idx="1">
+            <a:schemeClr val="accent1"/>
+          </a:lnRef>
+          <a:fillRef idx="0">
+            <a:schemeClr val="accent1"/>
+          </a:fillRef>
+          <a:effectRef idx="0">
+            <a:schemeClr val="accent1"/>
+          </a:effectRef>
+          <a:fontRef idx="minor">
+            <a:schemeClr val="tx1"/>
+          </a:fontRef>
+        </p:style>
+      </p:cxnSp>
+      <p:sp>
+        <p:nvSpPr>
+          <p:cNvPr id="38" name="流程图: 多文档 37">
+            <a:extLst>
+              <a:ext uri="{FF2B5EF4-FFF2-40B4-BE49-F238E27FC236}">
+                <a16:creationId xmlns:a16="http://schemas.microsoft.com/office/drawing/2014/main" id="{C7571964-A202-4DE0-82A7-A56969AF2DA4}"/>
+              </a:ext>
+            </a:extLst>
+          </p:cNvPr>
+          <p:cNvSpPr/>
+          <p:nvPr/>
+        </p:nvSpPr>
+        <p:spPr>
+          <a:xfrm>
+            <a:off x="9498178" y="4389234"/>
+            <a:ext cx="1224575" cy="993287"/>
+          </a:xfrm>
+          <a:prstGeom prst="flowChartMultidocument">
+            <a:avLst/>
+          </a:prstGeom>
+        </p:spPr>
+        <p:style>
+          <a:lnRef idx="2">
+            <a:schemeClr val="accent1"/>
+          </a:lnRef>
+          <a:fillRef idx="1">
+            <a:schemeClr val="lt1"/>
+          </a:fillRef>
+          <a:effectRef idx="0">
+            <a:schemeClr val="accent1"/>
+          </a:effectRef>
+          <a:fontRef idx="minor">
+            <a:schemeClr val="dk1"/>
+          </a:fontRef>
+        </p:style>
+        <p:txBody>
+          <a:bodyPr rtlCol="0" anchor="ctr"/>
+          <a:lstStyle/>
+          <a:p>
+            <a:pPr algn="ctr"/>
+            <a:r>
+              <a:rPr lang="zh-CN" altLang="en-US" sz="1200">
+                <a:solidFill>
+                  <a:schemeClr val="dk1"/>
+                </a:solidFill>
+                <a:latin typeface="Consolas" panose="020B0609020204030204" pitchFamily="49" charset="0"/>
+                <a:ea typeface="微软雅黑" panose="020B0503020204020204" pitchFamily="34" charset="-122"/>
+              </a:rPr>
+              <a:t>重构后的多个版本的参考基因组</a:t>
+            </a:r>
           </a:p>
         </p:txBody>
       </p:sp>
@@ -7197,6 +9554,285 @@
     <p:extLst>
       <p:ext uri="{BB962C8B-B14F-4D97-AF65-F5344CB8AC3E}">
         <p14:creationId xmlns:p14="http://schemas.microsoft.com/office/powerpoint/2010/main" val="3512484360"/>
+      </p:ext>
+    </p:extLst>
+  </p:cSld>
+  <p:clrMapOvr>
+    <a:masterClrMapping/>
+  </p:clrMapOvr>
+</p:sld>
+</file>
+
+<file path=ppt/slides/slide7.xml><?xml version="1.0" encoding="utf-8"?>
+<p:sld xmlns:a="http://schemas.openxmlformats.org/drawingml/2006/main" xmlns:r="http://schemas.openxmlformats.org/officeDocument/2006/relationships" xmlns:p="http://schemas.openxmlformats.org/presentationml/2006/main">
+  <p:cSld>
+    <p:spTree>
+      <p:nvGrpSpPr>
+        <p:cNvPr id="1" name=""/>
+        <p:cNvGrpSpPr/>
+        <p:nvPr/>
+      </p:nvGrpSpPr>
+      <p:grpSpPr>
+        <a:xfrm>
+          <a:off x="0" y="0"/>
+          <a:ext cx="0" cy="0"/>
+          <a:chOff x="0" y="0"/>
+          <a:chExt cx="0" cy="0"/>
+        </a:xfrm>
+      </p:grpSpPr>
+      <p:sp>
+        <p:nvSpPr>
+          <p:cNvPr id="179" name="副标题 2">
+            <a:extLst>
+              <a:ext uri="{FF2B5EF4-FFF2-40B4-BE49-F238E27FC236}">
+                <a16:creationId xmlns:a16="http://schemas.microsoft.com/office/drawing/2014/main" id="{43260F23-DF61-48C3-80C2-1D85923B9449}"/>
+              </a:ext>
+            </a:extLst>
+          </p:cNvPr>
+          <p:cNvSpPr txBox="1">
+            <a:spLocks/>
+          </p:cNvSpPr>
+          <p:nvPr/>
+        </p:nvSpPr>
+        <p:spPr>
+          <a:xfrm>
+            <a:off x="-1" y="958375"/>
+            <a:ext cx="4206241" cy="608372"/>
+          </a:xfrm>
+          <a:prstGeom prst="rect">
+            <a:avLst/>
+          </a:prstGeom>
+        </p:spPr>
+        <p:txBody>
+          <a:bodyPr vert="horz" wrap="square" lIns="91440" tIns="45720" rIns="91440" bIns="45720" rtlCol="0">
+            <a:spAutoFit/>
+          </a:bodyPr>
+          <a:lstStyle>
+            <a:lvl1pPr marL="0" indent="0" algn="ctr" defTabSz="540000" rtl="0" eaLnBrk="1" latinLnBrk="0" hangingPunct="1">
+              <a:lnSpc>
+                <a:spcPct val="90000"/>
+              </a:lnSpc>
+              <a:spcBef>
+                <a:spcPts val="1000"/>
+              </a:spcBef>
+              <a:buFont typeface="Arial" panose="020B0604020202020204" pitchFamily="34" charset="0"/>
+              <a:buNone/>
+              <a:defRPr sz="2400" kern="1200" baseline="0">
+                <a:solidFill>
+                  <a:schemeClr val="tx1"/>
+                </a:solidFill>
+                <a:latin typeface="Consolas" panose="020B0609020204030204" pitchFamily="49" charset="0"/>
+                <a:ea typeface="微软雅黑" panose="020B0503020204020204" pitchFamily="34" charset="-122"/>
+                <a:cs typeface="+mn-cs"/>
+              </a:defRPr>
+            </a:lvl1pPr>
+            <a:lvl2pPr marL="457200" indent="0" algn="ctr" defTabSz="540000" rtl="0" eaLnBrk="1" latinLnBrk="0" hangingPunct="1">
+              <a:lnSpc>
+                <a:spcPct val="90000"/>
+              </a:lnSpc>
+              <a:spcBef>
+                <a:spcPts val="500"/>
+              </a:spcBef>
+              <a:buFont typeface="Arial" panose="020B0604020202020204" pitchFamily="34" charset="0"/>
+              <a:buNone/>
+              <a:defRPr sz="2000" kern="1200" baseline="0">
+                <a:solidFill>
+                  <a:schemeClr val="tx1"/>
+                </a:solidFill>
+                <a:latin typeface="Consolas" panose="020B0609020204030204" pitchFamily="49" charset="0"/>
+                <a:ea typeface="微软雅黑" panose="020B0503020204020204" pitchFamily="34" charset="-122"/>
+                <a:cs typeface="+mn-cs"/>
+              </a:defRPr>
+            </a:lvl2pPr>
+            <a:lvl3pPr marL="914400" indent="0" algn="ctr" defTabSz="540000" rtl="0" eaLnBrk="1" latinLnBrk="0" hangingPunct="1">
+              <a:lnSpc>
+                <a:spcPct val="90000"/>
+              </a:lnSpc>
+              <a:spcBef>
+                <a:spcPts val="500"/>
+              </a:spcBef>
+              <a:buFont typeface="Arial" panose="020B0604020202020204" pitchFamily="34" charset="0"/>
+              <a:buNone/>
+              <a:defRPr sz="1800" kern="1200" baseline="0">
+                <a:solidFill>
+                  <a:schemeClr val="tx1"/>
+                </a:solidFill>
+                <a:latin typeface="Consolas" panose="020B0609020204030204" pitchFamily="49" charset="0"/>
+                <a:ea typeface="微软雅黑" panose="020B0503020204020204" pitchFamily="34" charset="-122"/>
+                <a:cs typeface="+mn-cs"/>
+              </a:defRPr>
+            </a:lvl3pPr>
+            <a:lvl4pPr marL="1371600" indent="0" algn="ctr" defTabSz="540000" rtl="0" eaLnBrk="1" latinLnBrk="0" hangingPunct="1">
+              <a:lnSpc>
+                <a:spcPct val="90000"/>
+              </a:lnSpc>
+              <a:spcBef>
+                <a:spcPts val="500"/>
+              </a:spcBef>
+              <a:buFont typeface="Arial" panose="020B0604020202020204" pitchFamily="34" charset="0"/>
+              <a:buNone/>
+              <a:defRPr sz="1600" kern="1200" baseline="0">
+                <a:solidFill>
+                  <a:schemeClr val="tx1"/>
+                </a:solidFill>
+                <a:latin typeface="Consolas" panose="020B0609020204030204" pitchFamily="49" charset="0"/>
+                <a:ea typeface="微软雅黑" panose="020B0503020204020204" pitchFamily="34" charset="-122"/>
+                <a:cs typeface="+mn-cs"/>
+              </a:defRPr>
+            </a:lvl4pPr>
+            <a:lvl5pPr marL="1828800" indent="0" algn="ctr" defTabSz="540000" rtl="0" eaLnBrk="1" latinLnBrk="0" hangingPunct="1">
+              <a:lnSpc>
+                <a:spcPct val="90000"/>
+              </a:lnSpc>
+              <a:spcBef>
+                <a:spcPts val="500"/>
+              </a:spcBef>
+              <a:buFont typeface="Arial" panose="020B0604020202020204" pitchFamily="34" charset="0"/>
+              <a:buNone/>
+              <a:defRPr sz="1600" kern="1200" baseline="0">
+                <a:solidFill>
+                  <a:schemeClr val="tx1"/>
+                </a:solidFill>
+                <a:latin typeface="Consolas" panose="020B0609020204030204" pitchFamily="49" charset="0"/>
+                <a:ea typeface="微软雅黑" panose="020B0503020204020204" pitchFamily="34" charset="-122"/>
+                <a:cs typeface="+mn-cs"/>
+              </a:defRPr>
+            </a:lvl5pPr>
+            <a:lvl6pPr marL="2286000" indent="0" algn="ctr" defTabSz="914400" rtl="0" eaLnBrk="1" latinLnBrk="0" hangingPunct="1">
+              <a:lnSpc>
+                <a:spcPct val="90000"/>
+              </a:lnSpc>
+              <a:spcBef>
+                <a:spcPts val="500"/>
+              </a:spcBef>
+              <a:buFont typeface="Arial" panose="020B0604020202020204" pitchFamily="34" charset="0"/>
+              <a:buNone/>
+              <a:defRPr sz="1600" kern="1200">
+                <a:solidFill>
+                  <a:schemeClr val="tx1"/>
+                </a:solidFill>
+                <a:latin typeface="+mn-lt"/>
+                <a:ea typeface="+mn-ea"/>
+                <a:cs typeface="+mn-cs"/>
+              </a:defRPr>
+            </a:lvl6pPr>
+            <a:lvl7pPr marL="2743200" indent="0" algn="ctr" defTabSz="914400" rtl="0" eaLnBrk="1" latinLnBrk="0" hangingPunct="1">
+              <a:lnSpc>
+                <a:spcPct val="90000"/>
+              </a:lnSpc>
+              <a:spcBef>
+                <a:spcPts val="500"/>
+              </a:spcBef>
+              <a:buFont typeface="Arial" panose="020B0604020202020204" pitchFamily="34" charset="0"/>
+              <a:buNone/>
+              <a:defRPr sz="1600" kern="1200">
+                <a:solidFill>
+                  <a:schemeClr val="tx1"/>
+                </a:solidFill>
+                <a:latin typeface="+mn-lt"/>
+                <a:ea typeface="+mn-ea"/>
+                <a:cs typeface="+mn-cs"/>
+              </a:defRPr>
+            </a:lvl7pPr>
+            <a:lvl8pPr marL="3200400" indent="0" algn="ctr" defTabSz="914400" rtl="0" eaLnBrk="1" latinLnBrk="0" hangingPunct="1">
+              <a:lnSpc>
+                <a:spcPct val="90000"/>
+              </a:lnSpc>
+              <a:spcBef>
+                <a:spcPts val="500"/>
+              </a:spcBef>
+              <a:buFont typeface="Arial" panose="020B0604020202020204" pitchFamily="34" charset="0"/>
+              <a:buNone/>
+              <a:defRPr sz="1600" kern="1200">
+                <a:solidFill>
+                  <a:schemeClr val="tx1"/>
+                </a:solidFill>
+                <a:latin typeface="+mn-lt"/>
+                <a:ea typeface="+mn-ea"/>
+                <a:cs typeface="+mn-cs"/>
+              </a:defRPr>
+            </a:lvl8pPr>
+            <a:lvl9pPr marL="3657600" indent="0" algn="ctr" defTabSz="914400" rtl="0" eaLnBrk="1" latinLnBrk="0" hangingPunct="1">
+              <a:lnSpc>
+                <a:spcPct val="90000"/>
+              </a:lnSpc>
+              <a:spcBef>
+                <a:spcPts val="500"/>
+              </a:spcBef>
+              <a:buFont typeface="Arial" panose="020B0604020202020204" pitchFamily="34" charset="0"/>
+              <a:buNone/>
+              <a:defRPr sz="1600" kern="1200">
+                <a:solidFill>
+                  <a:schemeClr val="tx1"/>
+                </a:solidFill>
+                <a:latin typeface="+mn-lt"/>
+                <a:ea typeface="+mn-ea"/>
+                <a:cs typeface="+mn-cs"/>
+              </a:defRPr>
+            </a:lvl9pPr>
+          </a:lstStyle>
+          <a:p>
+            <a:pPr algn="l"/>
+            <a:r>
+              <a:rPr lang="zh-CN" altLang="en-US" sz="1400"/>
+              <a:t>简单的思路整理（续）：</a:t>
+            </a:r>
+            <a:endParaRPr lang="en-US" altLang="zh-CN" sz="1400"/>
+          </a:p>
+          <a:p>
+            <a:pPr algn="l"/>
+            <a:r>
+              <a:rPr lang="en-US" altLang="zh-CN" sz="1400"/>
+              <a:t>	</a:t>
+            </a:r>
+          </a:p>
+        </p:txBody>
+      </p:sp>
+      <p:sp>
+        <p:nvSpPr>
+          <p:cNvPr id="180" name="副标题 2">
+            <a:extLst>
+              <a:ext uri="{FF2B5EF4-FFF2-40B4-BE49-F238E27FC236}">
+                <a16:creationId xmlns:a16="http://schemas.microsoft.com/office/drawing/2014/main" id="{DE0E770E-357B-468F-B9AA-55EC6987034C}"/>
+              </a:ext>
+            </a:extLst>
+          </p:cNvPr>
+          <p:cNvSpPr>
+            <a:spLocks noGrp="1"/>
+          </p:cNvSpPr>
+          <p:nvPr>
+            <p:ph type="subTitle" idx="1"/>
+          </p:nvPr>
+        </p:nvSpPr>
+        <p:spPr>
+          <a:xfrm>
+            <a:off x="-1" y="0"/>
+            <a:ext cx="5582195" cy="424732"/>
+          </a:xfrm>
+        </p:spPr>
+        <p:txBody>
+          <a:bodyPr/>
+          <a:lstStyle/>
+          <a:p>
+            <a:r>
+              <a:rPr lang="zh-CN" altLang="en-US"/>
+              <a:t>分情况解决比对结果差的</a:t>
+            </a:r>
+            <a:r>
+              <a:rPr lang="en-US" altLang="zh-CN"/>
+              <a:t>reads</a:t>
+            </a:r>
+            <a:r>
+              <a:rPr lang="zh-CN" altLang="en-US"/>
+              <a:t>的问题</a:t>
+            </a:r>
+          </a:p>
+        </p:txBody>
+      </p:sp>
+    </p:spTree>
+    <p:extLst>
+      <p:ext uri="{BB962C8B-B14F-4D97-AF65-F5344CB8AC3E}">
+        <p14:creationId xmlns:p14="http://schemas.microsoft.com/office/powerpoint/2010/main" val="2307329078"/>
       </p:ext>
     </p:extLst>
   </p:cSld>

</xml_diff>